<commit_message>
sir models 95% ready
</commit_message>
<xml_diff>
--- a/SIRModels/SIRModels.pptx
+++ b/SIRModels/SIRModels.pptx
@@ -14,13 +14,14 @@
     <p:sldId id="263" r:id="rId8"/>
     <p:sldId id="264" r:id="rId9"/>
     <p:sldId id="265" r:id="rId10"/>
-    <p:sldId id="266" r:id="rId11"/>
-    <p:sldId id="268" r:id="rId12"/>
-    <p:sldId id="267" r:id="rId13"/>
-    <p:sldId id="270" r:id="rId14"/>
-    <p:sldId id="271" r:id="rId15"/>
-    <p:sldId id="272" r:id="rId16"/>
-    <p:sldId id="273" r:id="rId17"/>
+    <p:sldId id="274" r:id="rId11"/>
+    <p:sldId id="266" r:id="rId12"/>
+    <p:sldId id="268" r:id="rId13"/>
+    <p:sldId id="267" r:id="rId14"/>
+    <p:sldId id="270" r:id="rId15"/>
+    <p:sldId id="271" r:id="rId16"/>
+    <p:sldId id="272" r:id="rId17"/>
+    <p:sldId id="273" r:id="rId18"/>
   </p:sldIdLst>
   <p:sldSz cx="9144000" cy="6858000" type="screen4x3"/>
   <p:notesSz cx="6858000" cy="9144000"/>
@@ -303,7 +304,7 @@
           <a:p>
             <a:fld id="{AA309A6D-C09C-4548-B29A-6CF363A7E532}" type="datetimeFigureOut">
               <a:rPr lang="fr-FR" smtClean="0"/>
-              <a:t>04/09/2015</a:t>
+              <a:t>06/09/2015</a:t>
             </a:fld>
             <a:endParaRPr lang="fr-BE"/>
           </a:p>
@@ -468,7 +469,7 @@
           <a:p>
             <a:fld id="{AA309A6D-C09C-4548-B29A-6CF363A7E532}" type="datetimeFigureOut">
               <a:rPr lang="fr-FR" smtClean="0"/>
-              <a:t>04/09/2015</a:t>
+              <a:t>06/09/2015</a:t>
             </a:fld>
             <a:endParaRPr lang="fr-BE"/>
           </a:p>
@@ -643,7 +644,7 @@
           <a:p>
             <a:fld id="{AA309A6D-C09C-4548-B29A-6CF363A7E532}" type="datetimeFigureOut">
               <a:rPr lang="fr-FR" smtClean="0"/>
-              <a:t>04/09/2015</a:t>
+              <a:t>06/09/2015</a:t>
             </a:fld>
             <a:endParaRPr lang="fr-BE"/>
           </a:p>
@@ -1391,7 +1392,7 @@
           <a:p>
             <a:fld id="{AA309A6D-C09C-4548-B29A-6CF363A7E532}" type="datetimeFigureOut">
               <a:rPr lang="fr-FR" smtClean="0"/>
-              <a:t>04/09/2015</a:t>
+              <a:t>06/09/2015</a:t>
             </a:fld>
             <a:endParaRPr lang="fr-BE"/>
           </a:p>
@@ -1632,7 +1633,7 @@
           <a:p>
             <a:fld id="{AA309A6D-C09C-4548-B29A-6CF363A7E532}" type="datetimeFigureOut">
               <a:rPr lang="fr-FR" smtClean="0"/>
-              <a:t>04/09/2015</a:t>
+              <a:t>06/09/2015</a:t>
             </a:fld>
             <a:endParaRPr lang="fr-BE"/>
           </a:p>
@@ -1915,7 +1916,7 @@
           <a:p>
             <a:fld id="{AA309A6D-C09C-4548-B29A-6CF363A7E532}" type="datetimeFigureOut">
               <a:rPr lang="fr-FR" smtClean="0"/>
-              <a:t>04/09/2015</a:t>
+              <a:t>06/09/2015</a:t>
             </a:fld>
             <a:endParaRPr lang="fr-BE"/>
           </a:p>
@@ -2332,7 +2333,7 @@
           <a:p>
             <a:fld id="{AA309A6D-C09C-4548-B29A-6CF363A7E532}" type="datetimeFigureOut">
               <a:rPr lang="fr-FR" smtClean="0"/>
-              <a:t>04/09/2015</a:t>
+              <a:t>06/09/2015</a:t>
             </a:fld>
             <a:endParaRPr lang="fr-BE"/>
           </a:p>
@@ -2445,7 +2446,7 @@
           <a:p>
             <a:fld id="{AA309A6D-C09C-4548-B29A-6CF363A7E532}" type="datetimeFigureOut">
               <a:rPr lang="fr-FR" smtClean="0"/>
-              <a:t>04/09/2015</a:t>
+              <a:t>06/09/2015</a:t>
             </a:fld>
             <a:endParaRPr lang="fr-BE"/>
           </a:p>
@@ -2535,7 +2536,7 @@
           <a:p>
             <a:fld id="{AA309A6D-C09C-4548-B29A-6CF363A7E532}" type="datetimeFigureOut">
               <a:rPr lang="fr-FR" smtClean="0"/>
-              <a:t>04/09/2015</a:t>
+              <a:t>06/09/2015</a:t>
             </a:fld>
             <a:endParaRPr lang="fr-BE"/>
           </a:p>
@@ -2807,7 +2808,7 @@
           <a:p>
             <a:fld id="{AA309A6D-C09C-4548-B29A-6CF363A7E532}" type="datetimeFigureOut">
               <a:rPr lang="fr-FR" smtClean="0"/>
-              <a:t>04/09/2015</a:t>
+              <a:t>06/09/2015</a:t>
             </a:fld>
             <a:endParaRPr lang="fr-BE"/>
           </a:p>
@@ -3055,7 +3056,7 @@
           <a:p>
             <a:fld id="{AA309A6D-C09C-4548-B29A-6CF363A7E532}" type="datetimeFigureOut">
               <a:rPr lang="fr-FR" smtClean="0"/>
-              <a:t>04/09/2015</a:t>
+              <a:t>06/09/2015</a:t>
             </a:fld>
             <a:endParaRPr lang="fr-BE"/>
           </a:p>
@@ -3263,7 +3264,7 @@
           <a:p>
             <a:fld id="{AA309A6D-C09C-4548-B29A-6CF363A7E532}" type="datetimeFigureOut">
               <a:rPr lang="fr-FR" smtClean="0"/>
-              <a:t>04/09/2015</a:t>
+              <a:t>06/09/2015</a:t>
             </a:fld>
             <a:endParaRPr lang="fr-BE"/>
           </a:p>
@@ -3689,7 +3690,6 @@
               <a:rPr lang="en-US" sz="3600" dirty="0" smtClean="0"/>
               <a:t> (R)</a:t>
             </a:r>
-            <a:endParaRPr lang="en-US" sz="3600" dirty="0" smtClean="0"/>
           </a:p>
         </p:txBody>
       </p:sp>
@@ -3762,6 +3762,1949 @@
       </p:grpSpPr>
       <p:sp>
         <p:nvSpPr>
+          <p:cNvPr id="2" name="Title 1"/>
+          <p:cNvSpPr>
+            <a:spLocks noGrp="1"/>
+          </p:cNvSpPr>
+          <p:nvPr>
+            <p:ph type="title"/>
+          </p:nvPr>
+        </p:nvSpPr>
+        <p:spPr>
+          <a:xfrm>
+            <a:off x="1331640" y="0"/>
+            <a:ext cx="7313612" cy="1143000"/>
+          </a:xfrm>
+        </p:spPr>
+        <p:txBody>
+          <a:bodyPr/>
+          <a:lstStyle/>
+          <a:p>
+            <a:r>
+              <a:rPr lang="bg-BG" dirty="0" smtClean="0"/>
+              <a:t>Числени методи</a:t>
+            </a:r>
+            <a:endParaRPr lang="en-US" dirty="0"/>
+          </a:p>
+        </p:txBody>
+      </p:sp>
+      <p:graphicFrame>
+        <p:nvGraphicFramePr>
+          <p:cNvPr id="5" name="Object 4"/>
+          <p:cNvGraphicFramePr>
+            <a:graphicFrameLocks noChangeAspect="1"/>
+          </p:cNvGraphicFramePr>
+          <p:nvPr>
+            <p:extLst>
+              <p:ext uri="{D42A27DB-BD31-4B8C-83A1-F6EECF244321}">
+                <p14:modId xmlns:p14="http://schemas.microsoft.com/office/powerpoint/2010/main" val="2558978414"/>
+              </p:ext>
+            </p:extLst>
+          </p:nvPr>
+        </p:nvGraphicFramePr>
+        <p:xfrm>
+          <a:off x="5580112" y="3356992"/>
+          <a:ext cx="3205096" cy="2880320"/>
+        </p:xfrm>
+        <a:graphic>
+          <a:graphicData uri="http://schemas.openxmlformats.org/presentationml/2006/ole">
+            <mc:AlternateContent xmlns:mc="http://schemas.openxmlformats.org/markup-compatibility/2006">
+              <mc:Choice xmlns:v="urn:schemas-microsoft-com:vml" Requires="v">
+                <p:oleObj spid="_x0000_s3077" name="Equation" r:id="rId3" imgW="2147040" imgH="1928520" progId="Equation.DSMT4">
+                  <p:embed/>
+                </p:oleObj>
+              </mc:Choice>
+              <mc:Fallback>
+                <p:oleObj name="Equation" r:id="rId3" imgW="2147040" imgH="1928520" progId="Equation.DSMT4">
+                  <p:embed/>
+                  <p:pic>
+                    <p:nvPicPr>
+                      <p:cNvPr id="0" name=""/>
+                      <p:cNvPicPr/>
+                      <p:nvPr/>
+                    </p:nvPicPr>
+                    <p:blipFill>
+                      <a:blip r:embed="rId4"/>
+                      <a:stretch>
+                        <a:fillRect/>
+                      </a:stretch>
+                    </p:blipFill>
+                    <p:spPr>
+                      <a:xfrm>
+                        <a:off x="5580112" y="3356992"/>
+                        <a:ext cx="3205096" cy="2880320"/>
+                      </a:xfrm>
+                      <a:prstGeom prst="rect">
+                        <a:avLst/>
+                      </a:prstGeom>
+                    </p:spPr>
+                  </p:pic>
+                </p:oleObj>
+              </mc:Fallback>
+            </mc:AlternateContent>
+          </a:graphicData>
+        </a:graphic>
+      </p:graphicFrame>
+      <p:sp>
+        <p:nvSpPr>
+          <p:cNvPr id="6" name="Text Placeholder 2"/>
+          <p:cNvSpPr>
+            <a:spLocks noGrp="1"/>
+          </p:cNvSpPr>
+          <p:nvPr>
+            <p:ph type="body" sz="half" idx="1"/>
+          </p:nvPr>
+        </p:nvSpPr>
+        <p:spPr>
+          <a:xfrm>
+            <a:off x="5148064" y="1124744"/>
+            <a:ext cx="3816424" cy="2376263"/>
+          </a:xfrm>
+        </p:spPr>
+        <p:txBody>
+          <a:bodyPr>
+            <a:normAutofit/>
+          </a:bodyPr>
+          <a:lstStyle/>
+          <a:p>
+            <a:r>
+              <a:rPr lang="bg-BG" sz="2200" dirty="0" smtClean="0"/>
+              <a:t>Четириетапен </a:t>
+            </a:r>
+            <a:r>
+              <a:rPr lang="bg-BG" sz="2200" dirty="0" smtClean="0"/>
+              <a:t>едностъпков </a:t>
+            </a:r>
+            <a:r>
+              <a:rPr lang="bg-BG" sz="2200" dirty="0" smtClean="0"/>
+              <a:t>метод на Рунге-Кута</a:t>
+            </a:r>
+          </a:p>
+          <a:p>
+            <a:r>
+              <a:rPr lang="bg-BG" sz="2200" dirty="0" smtClean="0"/>
+              <a:t>Грешка на опроксимацията – </a:t>
+            </a:r>
+            <a:r>
+              <a:rPr lang="en-US" sz="2200" i="1" dirty="0" smtClean="0"/>
+              <a:t>O</a:t>
+            </a:r>
+            <a:r>
+              <a:rPr lang="en-US" sz="2200" dirty="0" smtClean="0"/>
+              <a:t>(</a:t>
+            </a:r>
+            <a:r>
+              <a:rPr lang="en-US" sz="2200" i="1" dirty="0" smtClean="0"/>
+              <a:t>h</a:t>
+            </a:r>
+            <a:r>
+              <a:rPr lang="en-US" sz="2200" i="1" baseline="30000" dirty="0" smtClean="0"/>
+              <a:t>4</a:t>
+            </a:r>
+            <a:r>
+              <a:rPr lang="en-US" sz="2200" dirty="0" smtClean="0"/>
+              <a:t>)</a:t>
+            </a:r>
+            <a:endParaRPr lang="bg-BG" sz="2200" dirty="0" smtClean="0"/>
+          </a:p>
+          <a:p>
+            <a:r>
+              <a:rPr lang="bg-BG" sz="2200" dirty="0" smtClean="0"/>
+              <a:t>Постоянна стъпка </a:t>
+            </a:r>
+            <a:r>
+              <a:rPr lang="en-US" sz="2200" i="1" dirty="0" smtClean="0"/>
+              <a:t>h</a:t>
+            </a:r>
+            <a:endParaRPr lang="bg-BG" sz="2200" i="1" dirty="0" smtClean="0"/>
+          </a:p>
+          <a:p>
+            <a:pPr marL="457200" lvl="1" indent="0">
+              <a:buNone/>
+            </a:pPr>
+            <a:endParaRPr lang="en-US" i="1" dirty="0"/>
+          </a:p>
+        </p:txBody>
+      </p:sp>
+      <p:sp>
+        <p:nvSpPr>
+          <p:cNvPr id="7" name="Text Placeholder 2"/>
+          <p:cNvSpPr txBox="1">
+            <a:spLocks/>
+          </p:cNvSpPr>
+          <p:nvPr/>
+        </p:nvSpPr>
+        <p:spPr>
+          <a:xfrm>
+            <a:off x="126256" y="1202013"/>
+            <a:ext cx="4139976" cy="1512168"/>
+          </a:xfrm>
+          <a:prstGeom prst="rect">
+            <a:avLst/>
+          </a:prstGeom>
+        </p:spPr>
+        <p:txBody>
+          <a:bodyPr vert="horz" lIns="91440" tIns="45720" rIns="91440" bIns="45720" rtlCol="0">
+            <a:normAutofit fontScale="85000" lnSpcReduction="20000"/>
+          </a:bodyPr>
+          <a:lstStyle>
+            <a:lvl1pPr marL="342900" indent="-342900" algn="l" defTabSz="914400" rtl="0" eaLnBrk="1" latinLnBrk="0" hangingPunct="1">
+              <a:spcBef>
+                <a:spcPct val="20000"/>
+              </a:spcBef>
+              <a:buFont typeface="Arial" pitchFamily="34" charset="0"/>
+              <a:buChar char="•"/>
+              <a:defRPr sz="3200" kern="1200">
+                <a:solidFill>
+                  <a:schemeClr val="tx1"/>
+                </a:solidFill>
+                <a:latin typeface="+mn-lt"/>
+                <a:ea typeface="+mn-ea"/>
+                <a:cs typeface="+mn-cs"/>
+              </a:defRPr>
+            </a:lvl1pPr>
+            <a:lvl2pPr marL="742950" indent="-285750" algn="l" defTabSz="914400" rtl="0" eaLnBrk="1" latinLnBrk="0" hangingPunct="1">
+              <a:spcBef>
+                <a:spcPct val="20000"/>
+              </a:spcBef>
+              <a:buFont typeface="Arial" pitchFamily="34" charset="0"/>
+              <a:buChar char="–"/>
+              <a:defRPr sz="2800" kern="1200">
+                <a:solidFill>
+                  <a:schemeClr val="tx1"/>
+                </a:solidFill>
+                <a:latin typeface="+mn-lt"/>
+                <a:ea typeface="+mn-ea"/>
+                <a:cs typeface="+mn-cs"/>
+              </a:defRPr>
+            </a:lvl2pPr>
+            <a:lvl3pPr marL="1143000" indent="-228600" algn="l" defTabSz="914400" rtl="0" eaLnBrk="1" latinLnBrk="0" hangingPunct="1">
+              <a:spcBef>
+                <a:spcPct val="20000"/>
+              </a:spcBef>
+              <a:buFont typeface="Arial" pitchFamily="34" charset="0"/>
+              <a:buChar char="•"/>
+              <a:defRPr sz="2400" kern="1200">
+                <a:solidFill>
+                  <a:schemeClr val="tx1"/>
+                </a:solidFill>
+                <a:latin typeface="+mn-lt"/>
+                <a:ea typeface="+mn-ea"/>
+                <a:cs typeface="+mn-cs"/>
+              </a:defRPr>
+            </a:lvl3pPr>
+            <a:lvl4pPr marL="1600200" indent="-228600" algn="l" defTabSz="914400" rtl="0" eaLnBrk="1" latinLnBrk="0" hangingPunct="1">
+              <a:spcBef>
+                <a:spcPct val="20000"/>
+              </a:spcBef>
+              <a:buFont typeface="Arial" pitchFamily="34" charset="0"/>
+              <a:buChar char="–"/>
+              <a:defRPr sz="2000" kern="1200">
+                <a:solidFill>
+                  <a:schemeClr val="tx1"/>
+                </a:solidFill>
+                <a:latin typeface="+mn-lt"/>
+                <a:ea typeface="+mn-ea"/>
+                <a:cs typeface="+mn-cs"/>
+              </a:defRPr>
+            </a:lvl4pPr>
+            <a:lvl5pPr marL="2057400" indent="-228600" algn="l" defTabSz="914400" rtl="0" eaLnBrk="1" latinLnBrk="0" hangingPunct="1">
+              <a:spcBef>
+                <a:spcPct val="20000"/>
+              </a:spcBef>
+              <a:buFont typeface="Arial" pitchFamily="34" charset="0"/>
+              <a:buChar char="»"/>
+              <a:defRPr sz="2000" kern="1200">
+                <a:solidFill>
+                  <a:schemeClr val="tx1"/>
+                </a:solidFill>
+                <a:latin typeface="+mn-lt"/>
+                <a:ea typeface="+mn-ea"/>
+                <a:cs typeface="+mn-cs"/>
+              </a:defRPr>
+            </a:lvl5pPr>
+            <a:lvl6pPr marL="2514600" indent="-228600" algn="l" defTabSz="914400" rtl="0" eaLnBrk="1" latinLnBrk="0" hangingPunct="1">
+              <a:spcBef>
+                <a:spcPct val="20000"/>
+              </a:spcBef>
+              <a:buFont typeface="Arial" pitchFamily="34" charset="0"/>
+              <a:buChar char="•"/>
+              <a:defRPr sz="2000" kern="1200">
+                <a:solidFill>
+                  <a:schemeClr val="tx1"/>
+                </a:solidFill>
+                <a:latin typeface="+mn-lt"/>
+                <a:ea typeface="+mn-ea"/>
+                <a:cs typeface="+mn-cs"/>
+              </a:defRPr>
+            </a:lvl6pPr>
+            <a:lvl7pPr marL="2971800" indent="-228600" algn="l" defTabSz="914400" rtl="0" eaLnBrk="1" latinLnBrk="0" hangingPunct="1">
+              <a:spcBef>
+                <a:spcPct val="20000"/>
+              </a:spcBef>
+              <a:buFont typeface="Arial" pitchFamily="34" charset="0"/>
+              <a:buChar char="•"/>
+              <a:defRPr sz="2000" kern="1200">
+                <a:solidFill>
+                  <a:schemeClr val="tx1"/>
+                </a:solidFill>
+                <a:latin typeface="+mn-lt"/>
+                <a:ea typeface="+mn-ea"/>
+                <a:cs typeface="+mn-cs"/>
+              </a:defRPr>
+            </a:lvl7pPr>
+            <a:lvl8pPr marL="3429000" indent="-228600" algn="l" defTabSz="914400" rtl="0" eaLnBrk="1" latinLnBrk="0" hangingPunct="1">
+              <a:spcBef>
+                <a:spcPct val="20000"/>
+              </a:spcBef>
+              <a:buFont typeface="Arial" pitchFamily="34" charset="0"/>
+              <a:buChar char="•"/>
+              <a:defRPr sz="2000" kern="1200">
+                <a:solidFill>
+                  <a:schemeClr val="tx1"/>
+                </a:solidFill>
+                <a:latin typeface="+mn-lt"/>
+                <a:ea typeface="+mn-ea"/>
+                <a:cs typeface="+mn-cs"/>
+              </a:defRPr>
+            </a:lvl8pPr>
+            <a:lvl9pPr marL="3886200" indent="-228600" algn="l" defTabSz="914400" rtl="0" eaLnBrk="1" latinLnBrk="0" hangingPunct="1">
+              <a:spcBef>
+                <a:spcPct val="20000"/>
+              </a:spcBef>
+              <a:buFont typeface="Arial" pitchFamily="34" charset="0"/>
+              <a:buChar char="•"/>
+              <a:defRPr sz="2000" kern="1200">
+                <a:solidFill>
+                  <a:schemeClr val="tx1"/>
+                </a:solidFill>
+                <a:latin typeface="+mn-lt"/>
+                <a:ea typeface="+mn-ea"/>
+                <a:cs typeface="+mn-cs"/>
+              </a:defRPr>
+            </a:lvl9pPr>
+          </a:lstStyle>
+          <a:p>
+            <a:r>
+              <a:rPr lang="bg-BG" sz="2800" dirty="0" smtClean="0"/>
+              <a:t>Развитие в ред на Тейлор</a:t>
+            </a:r>
+          </a:p>
+          <a:p>
+            <a:r>
+              <a:rPr lang="bg-BG" sz="2800" dirty="0"/>
+              <a:t>Грешка на опроксимацията – </a:t>
+            </a:r>
+            <a:r>
+              <a:rPr lang="en-US" sz="2800" i="1" dirty="0" smtClean="0"/>
+              <a:t>O</a:t>
+            </a:r>
+            <a:r>
+              <a:rPr lang="en-US" sz="2800" dirty="0" smtClean="0"/>
+              <a:t>(</a:t>
+            </a:r>
+            <a:r>
+              <a:rPr lang="en-US" sz="2800" i="1" dirty="0" smtClean="0"/>
+              <a:t>h</a:t>
+            </a:r>
+            <a:r>
+              <a:rPr lang="en-US" sz="2800" i="1" baseline="30000" dirty="0" smtClean="0"/>
+              <a:t>4</a:t>
+            </a:r>
+            <a:r>
+              <a:rPr lang="en-US" sz="2800" dirty="0"/>
+              <a:t>)</a:t>
+            </a:r>
+            <a:endParaRPr lang="bg-BG" sz="2800" dirty="0"/>
+          </a:p>
+          <a:p>
+            <a:r>
+              <a:rPr lang="bg-BG" sz="2800" dirty="0"/>
+              <a:t>Постоянна стъпка </a:t>
+            </a:r>
+            <a:r>
+              <a:rPr lang="en-US" sz="2800" i="1" dirty="0" smtClean="0"/>
+              <a:t>h</a:t>
+            </a:r>
+            <a:endParaRPr lang="bg-BG" sz="2800" i="1" dirty="0" smtClean="0"/>
+          </a:p>
+          <a:p>
+            <a:endParaRPr lang="bg-BG" sz="2200" i="1" dirty="0"/>
+          </a:p>
+          <a:p>
+            <a:pPr marL="0" indent="0">
+              <a:buNone/>
+            </a:pPr>
+            <a:endParaRPr lang="en-US" sz="2200" i="1" dirty="0"/>
+          </a:p>
+          <a:p>
+            <a:pPr marL="0" indent="0">
+              <a:buNone/>
+            </a:pPr>
+            <a:endParaRPr lang="en-US" sz="2200" b="1" i="1" dirty="0"/>
+          </a:p>
+          <a:p>
+            <a:pPr marL="0" indent="0">
+              <a:buNone/>
+            </a:pPr>
+            <a:endParaRPr lang="en-US" sz="2200" b="0" i="1" dirty="0" smtClean="0"/>
+          </a:p>
+          <a:p>
+            <a:pPr marL="0" indent="0">
+              <a:buNone/>
+            </a:pPr>
+            <a:endParaRPr lang="en-US" sz="2200" i="1" dirty="0" smtClean="0"/>
+          </a:p>
+          <a:p>
+            <a:pPr marL="0" indent="0">
+              <a:buNone/>
+            </a:pPr>
+            <a:endParaRPr lang="en-US" sz="2200" i="1" dirty="0"/>
+          </a:p>
+          <a:p>
+            <a:pPr marL="0" indent="0">
+              <a:buNone/>
+            </a:pPr>
+            <a:endParaRPr lang="en-US" sz="2200" i="1" dirty="0"/>
+          </a:p>
+          <a:p>
+            <a:pPr marL="0" indent="0">
+              <a:buNone/>
+            </a:pPr>
+            <a:endParaRPr lang="bg-BG" sz="2200" i="1" dirty="0"/>
+          </a:p>
+        </p:txBody>
+      </p:sp>
+      <mc:AlternateContent xmlns:mc="http://schemas.openxmlformats.org/markup-compatibility/2006">
+        <mc:Choice xmlns:a14="http://schemas.microsoft.com/office/drawing/2010/main" Requires="a14">
+          <p:sp>
+            <p:nvSpPr>
+              <p:cNvPr id="8" name="Rectangle 7"/>
+              <p:cNvSpPr/>
+              <p:nvPr/>
+            </p:nvSpPr>
+            <p:spPr>
+              <a:xfrm>
+                <a:off x="436681" y="6021288"/>
+                <a:ext cx="4860056" cy="618246"/>
+              </a:xfrm>
+              <a:prstGeom prst="rect">
+                <a:avLst/>
+              </a:prstGeom>
+            </p:spPr>
+            <p:txBody>
+              <a:bodyPr wrap="square">
+                <a:spAutoFit/>
+              </a:bodyPr>
+              <a:lstStyle/>
+              <a:p>
+                <a14:m>
+                  <m:oMathPara xmlns:m="http://schemas.openxmlformats.org/officeDocument/2006/math">
+                    <m:oMathParaPr>
+                      <m:jc m:val="centerGroup"/>
+                    </m:oMathParaPr>
+                    <m:oMath xmlns:m="http://schemas.openxmlformats.org/officeDocument/2006/math">
+                      <m:sSup>
+                        <m:sSupPr>
+                          <m:ctrlPr>
+                            <a:rPr lang="en-US" i="1">
+                              <a:latin typeface="Cambria Math"/>
+                            </a:rPr>
+                          </m:ctrlPr>
+                        </m:sSupPr>
+                        <m:e>
+                          <m:r>
+                            <a:rPr lang="en-US" i="1">
+                              <a:latin typeface="Cambria Math"/>
+                            </a:rPr>
+                            <m:t>(</m:t>
+                          </m:r>
+                          <m:r>
+                            <a:rPr lang="en-US" i="1">
+                              <a:latin typeface="Cambria Math"/>
+                            </a:rPr>
+                            <m:t>𝑦𝑖</m:t>
+                          </m:r>
+                          <m:r>
+                            <a:rPr lang="en-US" i="1">
+                              <a:latin typeface="Cambria Math"/>
+                            </a:rPr>
+                            <m:t>)</m:t>
+                          </m:r>
+                        </m:e>
+                        <m:sup>
+                          <m:r>
+                            <a:rPr lang="en-US" i="1">
+                              <a:latin typeface="Cambria Math"/>
+                            </a:rPr>
+                            <m:t>′′′′</m:t>
+                          </m:r>
+                        </m:sup>
+                      </m:sSup>
+                      <m:r>
+                        <a:rPr lang="en-US" i="1">
+                          <a:latin typeface="Cambria Math"/>
+                        </a:rPr>
+                        <m:t>=</m:t>
+                      </m:r>
+                      <m:r>
+                        <a:rPr lang="en-US" i="1">
+                          <a:latin typeface="Cambria Math"/>
+                        </a:rPr>
+                        <m:t>𝑓</m:t>
+                      </m:r>
+                      <m:r>
+                        <a:rPr lang="en-US" i="1" baseline="-25000">
+                          <a:latin typeface="Cambria Math"/>
+                        </a:rPr>
+                        <m:t>3</m:t>
+                      </m:r>
+                      <m:d>
+                        <m:dPr>
+                          <m:ctrlPr>
+                            <a:rPr lang="en-US" i="1">
+                              <a:latin typeface="Cambria Math"/>
+                            </a:rPr>
+                          </m:ctrlPr>
+                        </m:dPr>
+                        <m:e>
+                          <m:r>
+                            <a:rPr lang="en-US" i="1">
+                              <a:latin typeface="Cambria Math"/>
+                            </a:rPr>
+                            <m:t>𝑦</m:t>
+                          </m:r>
+                          <m:r>
+                            <a:rPr lang="en-US" i="1" baseline="-25000">
+                              <a:latin typeface="Cambria Math"/>
+                            </a:rPr>
+                            <m:t>𝑖</m:t>
+                          </m:r>
+                          <m:r>
+                            <a:rPr lang="en-US" i="1">
+                              <a:latin typeface="Cambria Math"/>
+                            </a:rPr>
+                            <m:t>,</m:t>
+                          </m:r>
+                          <m:sSup>
+                            <m:sSupPr>
+                              <m:ctrlPr>
+                                <a:rPr lang="en-US" i="1">
+                                  <a:latin typeface="Cambria Math"/>
+                                </a:rPr>
+                              </m:ctrlPr>
+                            </m:sSupPr>
+                            <m:e>
+                              <m:d>
+                                <m:dPr>
+                                  <m:ctrlPr>
+                                    <a:rPr lang="en-US" i="1">
+                                      <a:latin typeface="Cambria Math"/>
+                                    </a:rPr>
+                                  </m:ctrlPr>
+                                </m:dPr>
+                                <m:e>
+                                  <m:r>
+                                    <a:rPr lang="en-US" i="1">
+                                      <a:latin typeface="Cambria Math"/>
+                                    </a:rPr>
+                                    <m:t>𝑦</m:t>
+                                  </m:r>
+                                  <m:r>
+                                    <a:rPr lang="en-US" i="1" baseline="-25000">
+                                      <a:latin typeface="Cambria Math"/>
+                                    </a:rPr>
+                                    <m:t>𝑖</m:t>
+                                  </m:r>
+                                </m:e>
+                              </m:d>
+                            </m:e>
+                            <m:sup>
+                              <m:r>
+                                <a:rPr lang="en-US" i="1">
+                                  <a:latin typeface="Cambria Math"/>
+                                </a:rPr>
+                                <m:t>′</m:t>
+                              </m:r>
+                            </m:sup>
+                          </m:sSup>
+                          <m:r>
+                            <a:rPr lang="en-US" i="1">
+                              <a:latin typeface="Cambria Math"/>
+                            </a:rPr>
+                            <m:t>,</m:t>
+                          </m:r>
+                          <m:sSup>
+                            <m:sSupPr>
+                              <m:ctrlPr>
+                                <a:rPr lang="en-US" i="1">
+                                  <a:latin typeface="Cambria Math"/>
+                                </a:rPr>
+                              </m:ctrlPr>
+                            </m:sSupPr>
+                            <m:e>
+                              <m:d>
+                                <m:dPr>
+                                  <m:ctrlPr>
+                                    <a:rPr lang="en-US" i="1">
+                                      <a:latin typeface="Cambria Math"/>
+                                    </a:rPr>
+                                  </m:ctrlPr>
+                                </m:dPr>
+                                <m:e>
+                                  <m:r>
+                                    <a:rPr lang="en-US" i="1">
+                                      <a:latin typeface="Cambria Math"/>
+                                    </a:rPr>
+                                    <m:t>𝑦</m:t>
+                                  </m:r>
+                                  <m:r>
+                                    <a:rPr lang="en-US" i="1" baseline="-25000">
+                                      <a:latin typeface="Cambria Math"/>
+                                    </a:rPr>
+                                    <m:t>𝑖</m:t>
+                                  </m:r>
+                                </m:e>
+                              </m:d>
+                            </m:e>
+                            <m:sup>
+                              <m:r>
+                                <a:rPr lang="en-US" i="1">
+                                  <a:latin typeface="Cambria Math"/>
+                                </a:rPr>
+                                <m:t>′′</m:t>
+                              </m:r>
+                            </m:sup>
+                          </m:sSup>
+                          <m:r>
+                            <a:rPr lang="en-US" i="1">
+                              <a:latin typeface="Cambria Math"/>
+                            </a:rPr>
+                            <m:t>,</m:t>
+                          </m:r>
+                          <m:sSup>
+                            <m:sSupPr>
+                              <m:ctrlPr>
+                                <a:rPr lang="en-US" i="1">
+                                  <a:latin typeface="Cambria Math"/>
+                                </a:rPr>
+                              </m:ctrlPr>
+                            </m:sSupPr>
+                            <m:e>
+                              <m:d>
+                                <m:dPr>
+                                  <m:ctrlPr>
+                                    <a:rPr lang="en-US" i="1">
+                                      <a:latin typeface="Cambria Math"/>
+                                    </a:rPr>
+                                  </m:ctrlPr>
+                                </m:dPr>
+                                <m:e>
+                                  <m:r>
+                                    <a:rPr lang="en-US" i="1">
+                                      <a:latin typeface="Cambria Math"/>
+                                    </a:rPr>
+                                    <m:t>𝑦</m:t>
+                                  </m:r>
+                                  <m:r>
+                                    <a:rPr lang="en-US" i="1" baseline="-25000">
+                                      <a:latin typeface="Cambria Math"/>
+                                    </a:rPr>
+                                    <m:t>𝑖</m:t>
+                                  </m:r>
+                                </m:e>
+                              </m:d>
+                            </m:e>
+                            <m:sup>
+                              <m:r>
+                                <a:rPr lang="en-US" i="1">
+                                  <a:latin typeface="Cambria Math"/>
+                                </a:rPr>
+                                <m:t>′′</m:t>
+                              </m:r>
+                            </m:sup>
+                          </m:sSup>
+                          <m:r>
+                            <a:rPr lang="en-US" i="1">
+                              <a:latin typeface="Cambria Math"/>
+                            </a:rPr>
+                            <m:t>′</m:t>
+                          </m:r>
+                        </m:e>
+                      </m:d>
+                      <m:r>
+                        <a:rPr lang="en-US" i="1">
+                          <a:latin typeface="Cambria Math"/>
+                        </a:rPr>
+                        <m:t>≔</m:t>
+                      </m:r>
+                      <m:f>
+                        <m:fPr>
+                          <m:ctrlPr>
+                            <a:rPr lang="en-US" i="1">
+                              <a:latin typeface="Cambria Math"/>
+                            </a:rPr>
+                          </m:ctrlPr>
+                        </m:fPr>
+                        <m:num>
+                          <m:r>
+                            <a:rPr lang="en-US" i="1">
+                              <a:latin typeface="Cambria Math"/>
+                            </a:rPr>
+                            <m:t>𝑑</m:t>
+                          </m:r>
+                          <m:r>
+                            <a:rPr lang="en-US" i="1" baseline="30000">
+                              <a:latin typeface="Cambria Math"/>
+                            </a:rPr>
+                            <m:t>3</m:t>
+                          </m:r>
+                        </m:num>
+                        <m:den>
+                          <m:r>
+                            <a:rPr lang="en-US" i="1">
+                              <a:latin typeface="Cambria Math"/>
+                            </a:rPr>
+                            <m:t>𝑑𝑥</m:t>
+                          </m:r>
+                          <m:r>
+                            <a:rPr lang="en-US" i="1" baseline="30000">
+                              <a:latin typeface="Cambria Math"/>
+                            </a:rPr>
+                            <m:t>3</m:t>
+                          </m:r>
+                        </m:den>
+                      </m:f>
+                      <m:r>
+                        <a:rPr lang="en-US" i="1">
+                          <a:latin typeface="Cambria Math"/>
+                        </a:rPr>
+                        <m:t>𝑓</m:t>
+                      </m:r>
+                      <m:r>
+                        <a:rPr lang="en-US" i="1">
+                          <a:latin typeface="Cambria Math"/>
+                        </a:rPr>
+                        <m:t>(</m:t>
+                      </m:r>
+                      <m:r>
+                        <a:rPr lang="en-US" i="1">
+                          <a:latin typeface="Cambria Math"/>
+                        </a:rPr>
+                        <m:t>𝑦𝑖</m:t>
+                      </m:r>
+                      <m:r>
+                        <a:rPr lang="en-US" i="1">
+                          <a:latin typeface="Cambria Math"/>
+                        </a:rPr>
+                        <m:t>)</m:t>
+                      </m:r>
+                    </m:oMath>
+                  </m:oMathPara>
+                </a14:m>
+                <a:endParaRPr lang="en-US" i="1" dirty="0"/>
+              </a:p>
+            </p:txBody>
+          </p:sp>
+        </mc:Choice>
+        <mc:Fallback>
+          <p:sp>
+            <p:nvSpPr>
+              <p:cNvPr id="8" name="Rectangle 7"/>
+              <p:cNvSpPr>
+                <a:spLocks noRot="1" noChangeAspect="1" noMove="1" noResize="1" noEditPoints="1" noAdjustHandles="1" noChangeArrowheads="1" noChangeShapeType="1" noTextEdit="1"/>
+              </p:cNvSpPr>
+              <p:nvPr/>
+            </p:nvSpPr>
+            <p:spPr>
+              <a:xfrm>
+                <a:off x="436681" y="6021288"/>
+                <a:ext cx="4860056" cy="618246"/>
+              </a:xfrm>
+              <a:prstGeom prst="rect">
+                <a:avLst/>
+              </a:prstGeom>
+              <a:blipFill rotWithShape="1">
+                <a:blip r:embed="rId5"/>
+                <a:stretch>
+                  <a:fillRect/>
+                </a:stretch>
+              </a:blipFill>
+            </p:spPr>
+            <p:txBody>
+              <a:bodyPr/>
+              <a:lstStyle/>
+              <a:p>
+                <a:r>
+                  <a:rPr lang="en-US">
+                    <a:noFill/>
+                  </a:rPr>
+                  <a:t> </a:t>
+                </a:r>
+              </a:p>
+            </p:txBody>
+          </p:sp>
+        </mc:Fallback>
+      </mc:AlternateContent>
+      <mc:AlternateContent xmlns:mc="http://schemas.openxmlformats.org/markup-compatibility/2006">
+        <mc:Choice xmlns:a14="http://schemas.microsoft.com/office/drawing/2010/main" Requires="a14">
+          <p:sp>
+            <p:nvSpPr>
+              <p:cNvPr id="9" name="Rectangle 8"/>
+              <p:cNvSpPr/>
+              <p:nvPr/>
+            </p:nvSpPr>
+            <p:spPr>
+              <a:xfrm>
+                <a:off x="436681" y="5428737"/>
+                <a:ext cx="4038990" cy="618246"/>
+              </a:xfrm>
+              <a:prstGeom prst="rect">
+                <a:avLst/>
+              </a:prstGeom>
+            </p:spPr>
+            <p:txBody>
+              <a:bodyPr wrap="none">
+                <a:spAutoFit/>
+              </a:bodyPr>
+              <a:lstStyle/>
+              <a:p>
+                <a14:m>
+                  <m:oMathPara xmlns:m="http://schemas.openxmlformats.org/officeDocument/2006/math">
+                    <m:oMathParaPr>
+                      <m:jc m:val="centerGroup"/>
+                    </m:oMathParaPr>
+                    <m:oMath xmlns:m="http://schemas.openxmlformats.org/officeDocument/2006/math">
+                      <m:sSup>
+                        <m:sSupPr>
+                          <m:ctrlPr>
+                            <a:rPr lang="en-US" i="1">
+                              <a:latin typeface="Cambria Math"/>
+                            </a:rPr>
+                          </m:ctrlPr>
+                        </m:sSupPr>
+                        <m:e>
+                          <m:r>
+                            <a:rPr lang="en-US" i="1">
+                              <a:latin typeface="Cambria Math"/>
+                            </a:rPr>
+                            <m:t>(</m:t>
+                          </m:r>
+                          <m:r>
+                            <a:rPr lang="en-US" i="1">
+                              <a:latin typeface="Cambria Math"/>
+                            </a:rPr>
+                            <m:t>𝑦𝑖</m:t>
+                          </m:r>
+                          <m:r>
+                            <a:rPr lang="en-US" i="1">
+                              <a:latin typeface="Cambria Math"/>
+                            </a:rPr>
+                            <m:t>)</m:t>
+                          </m:r>
+                        </m:e>
+                        <m:sup>
+                          <m:r>
+                            <a:rPr lang="en-US" i="1">
+                              <a:latin typeface="Cambria Math"/>
+                            </a:rPr>
+                            <m:t>′′′</m:t>
+                          </m:r>
+                        </m:sup>
+                      </m:sSup>
+                      <m:r>
+                        <a:rPr lang="en-US" i="1">
+                          <a:latin typeface="Cambria Math"/>
+                        </a:rPr>
+                        <m:t>=</m:t>
+                      </m:r>
+                      <m:r>
+                        <a:rPr lang="en-US" i="1">
+                          <a:latin typeface="Cambria Math"/>
+                        </a:rPr>
+                        <m:t>𝑓</m:t>
+                      </m:r>
+                      <m:r>
+                        <a:rPr lang="en-US" i="1" baseline="-25000">
+                          <a:latin typeface="Cambria Math"/>
+                        </a:rPr>
+                        <m:t>2</m:t>
+                      </m:r>
+                      <m:d>
+                        <m:dPr>
+                          <m:ctrlPr>
+                            <a:rPr lang="en-US" i="1">
+                              <a:latin typeface="Cambria Math"/>
+                            </a:rPr>
+                          </m:ctrlPr>
+                        </m:dPr>
+                        <m:e>
+                          <m:r>
+                            <a:rPr lang="en-US" i="1">
+                              <a:latin typeface="Cambria Math"/>
+                            </a:rPr>
+                            <m:t>𝑦</m:t>
+                          </m:r>
+                          <m:r>
+                            <a:rPr lang="en-US" i="1" baseline="-25000">
+                              <a:latin typeface="Cambria Math"/>
+                            </a:rPr>
+                            <m:t>𝑖</m:t>
+                          </m:r>
+                          <m:r>
+                            <a:rPr lang="en-US" i="1">
+                              <a:latin typeface="Cambria Math"/>
+                            </a:rPr>
+                            <m:t>,</m:t>
+                          </m:r>
+                          <m:sSup>
+                            <m:sSupPr>
+                              <m:ctrlPr>
+                                <a:rPr lang="en-US" i="1">
+                                  <a:latin typeface="Cambria Math"/>
+                                </a:rPr>
+                              </m:ctrlPr>
+                            </m:sSupPr>
+                            <m:e>
+                              <m:d>
+                                <m:dPr>
+                                  <m:ctrlPr>
+                                    <a:rPr lang="en-US" i="1">
+                                      <a:latin typeface="Cambria Math"/>
+                                    </a:rPr>
+                                  </m:ctrlPr>
+                                </m:dPr>
+                                <m:e>
+                                  <m:r>
+                                    <a:rPr lang="en-US" i="1">
+                                      <a:latin typeface="Cambria Math"/>
+                                    </a:rPr>
+                                    <m:t>𝑦</m:t>
+                                  </m:r>
+                                  <m:r>
+                                    <a:rPr lang="en-US" i="1" baseline="-25000">
+                                      <a:latin typeface="Cambria Math"/>
+                                    </a:rPr>
+                                    <m:t>𝑖</m:t>
+                                  </m:r>
+                                </m:e>
+                              </m:d>
+                            </m:e>
+                            <m:sup>
+                              <m:r>
+                                <a:rPr lang="en-US" i="1">
+                                  <a:latin typeface="Cambria Math"/>
+                                </a:rPr>
+                                <m:t>′</m:t>
+                              </m:r>
+                            </m:sup>
+                          </m:sSup>
+                          <m:r>
+                            <a:rPr lang="en-US" i="1">
+                              <a:latin typeface="Cambria Math"/>
+                            </a:rPr>
+                            <m:t>,</m:t>
+                          </m:r>
+                          <m:sSup>
+                            <m:sSupPr>
+                              <m:ctrlPr>
+                                <a:rPr lang="en-US" i="1">
+                                  <a:latin typeface="Cambria Math"/>
+                                </a:rPr>
+                              </m:ctrlPr>
+                            </m:sSupPr>
+                            <m:e>
+                              <m:d>
+                                <m:dPr>
+                                  <m:ctrlPr>
+                                    <a:rPr lang="en-US" i="1">
+                                      <a:latin typeface="Cambria Math"/>
+                                    </a:rPr>
+                                  </m:ctrlPr>
+                                </m:dPr>
+                                <m:e>
+                                  <m:r>
+                                    <a:rPr lang="en-US" i="1">
+                                      <a:latin typeface="Cambria Math"/>
+                                    </a:rPr>
+                                    <m:t>𝑦</m:t>
+                                  </m:r>
+                                  <m:r>
+                                    <a:rPr lang="en-US" i="1" baseline="-25000">
+                                      <a:latin typeface="Cambria Math"/>
+                                    </a:rPr>
+                                    <m:t>𝑖</m:t>
+                                  </m:r>
+                                </m:e>
+                              </m:d>
+                            </m:e>
+                            <m:sup>
+                              <m:r>
+                                <a:rPr lang="en-US" i="1">
+                                  <a:latin typeface="Cambria Math"/>
+                                </a:rPr>
+                                <m:t>′′</m:t>
+                              </m:r>
+                            </m:sup>
+                          </m:sSup>
+                        </m:e>
+                      </m:d>
+                      <m:r>
+                        <a:rPr lang="en-US" i="1">
+                          <a:latin typeface="Cambria Math"/>
+                        </a:rPr>
+                        <m:t>≔</m:t>
+                      </m:r>
+                      <m:f>
+                        <m:fPr>
+                          <m:ctrlPr>
+                            <a:rPr lang="en-US" i="1">
+                              <a:latin typeface="Cambria Math"/>
+                            </a:rPr>
+                          </m:ctrlPr>
+                        </m:fPr>
+                        <m:num>
+                          <m:r>
+                            <a:rPr lang="en-US" i="1">
+                              <a:latin typeface="Cambria Math"/>
+                            </a:rPr>
+                            <m:t>𝑑</m:t>
+                          </m:r>
+                          <m:r>
+                            <a:rPr lang="en-US" i="1" baseline="30000">
+                              <a:latin typeface="Cambria Math"/>
+                            </a:rPr>
+                            <m:t>2</m:t>
+                          </m:r>
+                        </m:num>
+                        <m:den>
+                          <m:r>
+                            <a:rPr lang="en-US" i="1">
+                              <a:latin typeface="Cambria Math"/>
+                            </a:rPr>
+                            <m:t>𝑑𝑥</m:t>
+                          </m:r>
+                          <m:r>
+                            <a:rPr lang="en-US" i="1" baseline="30000">
+                              <a:latin typeface="Cambria Math"/>
+                            </a:rPr>
+                            <m:t>2</m:t>
+                          </m:r>
+                        </m:den>
+                      </m:f>
+                      <m:r>
+                        <a:rPr lang="en-US" i="1">
+                          <a:latin typeface="Cambria Math"/>
+                        </a:rPr>
+                        <m:t>𝑓</m:t>
+                      </m:r>
+                      <m:r>
+                        <a:rPr lang="en-US" i="1">
+                          <a:latin typeface="Cambria Math"/>
+                        </a:rPr>
+                        <m:t>(</m:t>
+                      </m:r>
+                      <m:r>
+                        <a:rPr lang="en-US" i="1">
+                          <a:latin typeface="Cambria Math"/>
+                        </a:rPr>
+                        <m:t>𝑦𝑖</m:t>
+                      </m:r>
+                      <m:r>
+                        <a:rPr lang="en-US" i="1">
+                          <a:latin typeface="Cambria Math"/>
+                        </a:rPr>
+                        <m:t>)</m:t>
+                      </m:r>
+                    </m:oMath>
+                  </m:oMathPara>
+                </a14:m>
+                <a:endParaRPr lang="en-US" dirty="0"/>
+              </a:p>
+            </p:txBody>
+          </p:sp>
+        </mc:Choice>
+        <mc:Fallback>
+          <p:sp>
+            <p:nvSpPr>
+              <p:cNvPr id="9" name="Rectangle 8"/>
+              <p:cNvSpPr>
+                <a:spLocks noRot="1" noChangeAspect="1" noMove="1" noResize="1" noEditPoints="1" noAdjustHandles="1" noChangeArrowheads="1" noChangeShapeType="1" noTextEdit="1"/>
+              </p:cNvSpPr>
+              <p:nvPr/>
+            </p:nvSpPr>
+            <p:spPr>
+              <a:xfrm>
+                <a:off x="436681" y="5428737"/>
+                <a:ext cx="4038990" cy="618246"/>
+              </a:xfrm>
+              <a:prstGeom prst="rect">
+                <a:avLst/>
+              </a:prstGeom>
+              <a:blipFill rotWithShape="1">
+                <a:blip r:embed="rId6"/>
+                <a:stretch>
+                  <a:fillRect/>
+                </a:stretch>
+              </a:blipFill>
+            </p:spPr>
+            <p:txBody>
+              <a:bodyPr/>
+              <a:lstStyle/>
+              <a:p>
+                <a:r>
+                  <a:rPr lang="en-US">
+                    <a:noFill/>
+                  </a:rPr>
+                  <a:t> </a:t>
+                </a:r>
+              </a:p>
+            </p:txBody>
+          </p:sp>
+        </mc:Fallback>
+      </mc:AlternateContent>
+      <mc:AlternateContent xmlns:mc="http://schemas.openxmlformats.org/markup-compatibility/2006">
+        <mc:Choice xmlns:a14="http://schemas.microsoft.com/office/drawing/2010/main" Requires="a14">
+          <p:sp>
+            <p:nvSpPr>
+              <p:cNvPr id="10" name="Rectangle 9"/>
+              <p:cNvSpPr/>
+              <p:nvPr/>
+            </p:nvSpPr>
+            <p:spPr>
+              <a:xfrm>
+                <a:off x="436681" y="4808477"/>
+                <a:ext cx="3310137" cy="618246"/>
+              </a:xfrm>
+              <a:prstGeom prst="rect">
+                <a:avLst/>
+              </a:prstGeom>
+            </p:spPr>
+            <p:txBody>
+              <a:bodyPr wrap="none">
+                <a:spAutoFit/>
+              </a:bodyPr>
+              <a:lstStyle/>
+              <a:p>
+                <a14:m>
+                  <m:oMathPara xmlns:m="http://schemas.openxmlformats.org/officeDocument/2006/math">
+                    <m:oMathParaPr>
+                      <m:jc m:val="centerGroup"/>
+                    </m:oMathParaPr>
+                    <m:oMath xmlns:m="http://schemas.openxmlformats.org/officeDocument/2006/math">
+                      <m:sSup>
+                        <m:sSupPr>
+                          <m:ctrlPr>
+                            <a:rPr lang="en-US" i="1">
+                              <a:latin typeface="Cambria Math"/>
+                            </a:rPr>
+                          </m:ctrlPr>
+                        </m:sSupPr>
+                        <m:e>
+                          <m:r>
+                            <a:rPr lang="en-US" i="1">
+                              <a:latin typeface="Cambria Math"/>
+                            </a:rPr>
+                            <m:t>(</m:t>
+                          </m:r>
+                          <m:r>
+                            <a:rPr lang="en-US" i="1">
+                              <a:latin typeface="Cambria Math"/>
+                            </a:rPr>
+                            <m:t>𝑦𝑖</m:t>
+                          </m:r>
+                          <m:r>
+                            <a:rPr lang="en-US" i="1">
+                              <a:latin typeface="Cambria Math"/>
+                            </a:rPr>
+                            <m:t>)</m:t>
+                          </m:r>
+                        </m:e>
+                        <m:sup>
+                          <m:r>
+                            <a:rPr lang="en-US" i="1">
+                              <a:latin typeface="Cambria Math"/>
+                            </a:rPr>
+                            <m:t>′′</m:t>
+                          </m:r>
+                        </m:sup>
+                      </m:sSup>
+                      <m:r>
+                        <a:rPr lang="en-US" i="1">
+                          <a:latin typeface="Cambria Math"/>
+                        </a:rPr>
+                        <m:t>=</m:t>
+                      </m:r>
+                      <m:r>
+                        <a:rPr lang="en-US" i="1">
+                          <a:latin typeface="Cambria Math"/>
+                        </a:rPr>
+                        <m:t>𝑓</m:t>
+                      </m:r>
+                      <m:r>
+                        <a:rPr lang="en-US" i="1" baseline="-25000">
+                          <a:latin typeface="Cambria Math"/>
+                        </a:rPr>
+                        <m:t>1</m:t>
+                      </m:r>
+                      <m:d>
+                        <m:dPr>
+                          <m:ctrlPr>
+                            <a:rPr lang="en-US" i="1">
+                              <a:latin typeface="Cambria Math"/>
+                            </a:rPr>
+                          </m:ctrlPr>
+                        </m:dPr>
+                        <m:e>
+                          <m:r>
+                            <a:rPr lang="en-US" i="1">
+                              <a:latin typeface="Cambria Math"/>
+                            </a:rPr>
+                            <m:t>𝑦</m:t>
+                          </m:r>
+                          <m:r>
+                            <a:rPr lang="en-US" i="1" baseline="-25000">
+                              <a:latin typeface="Cambria Math"/>
+                            </a:rPr>
+                            <m:t>𝑖</m:t>
+                          </m:r>
+                          <m:r>
+                            <a:rPr lang="en-US" i="1">
+                              <a:latin typeface="Cambria Math"/>
+                            </a:rPr>
+                            <m:t>,</m:t>
+                          </m:r>
+                          <m:sSup>
+                            <m:sSupPr>
+                              <m:ctrlPr>
+                                <a:rPr lang="en-US" i="1">
+                                  <a:latin typeface="Cambria Math"/>
+                                </a:rPr>
+                              </m:ctrlPr>
+                            </m:sSupPr>
+                            <m:e>
+                              <m:d>
+                                <m:dPr>
+                                  <m:ctrlPr>
+                                    <a:rPr lang="en-US" i="1">
+                                      <a:latin typeface="Cambria Math"/>
+                                    </a:rPr>
+                                  </m:ctrlPr>
+                                </m:dPr>
+                                <m:e>
+                                  <m:r>
+                                    <a:rPr lang="en-US" i="1">
+                                      <a:latin typeface="Cambria Math"/>
+                                    </a:rPr>
+                                    <m:t>𝑦</m:t>
+                                  </m:r>
+                                  <m:r>
+                                    <a:rPr lang="en-US" i="1" baseline="-25000">
+                                      <a:latin typeface="Cambria Math"/>
+                                    </a:rPr>
+                                    <m:t>𝑖</m:t>
+                                  </m:r>
+                                </m:e>
+                              </m:d>
+                            </m:e>
+                            <m:sup>
+                              <m:r>
+                                <a:rPr lang="en-US" i="1">
+                                  <a:latin typeface="Cambria Math"/>
+                                </a:rPr>
+                                <m:t>′</m:t>
+                              </m:r>
+                            </m:sup>
+                          </m:sSup>
+                        </m:e>
+                      </m:d>
+                      <m:r>
+                        <a:rPr lang="en-US" i="1">
+                          <a:latin typeface="Cambria Math"/>
+                        </a:rPr>
+                        <m:t>≔</m:t>
+                      </m:r>
+                      <m:f>
+                        <m:fPr>
+                          <m:ctrlPr>
+                            <a:rPr lang="en-US" i="1">
+                              <a:latin typeface="Cambria Math"/>
+                            </a:rPr>
+                          </m:ctrlPr>
+                        </m:fPr>
+                        <m:num>
+                          <m:r>
+                            <a:rPr lang="en-US" i="1">
+                              <a:latin typeface="Cambria Math"/>
+                            </a:rPr>
+                            <m:t>𝑑</m:t>
+                          </m:r>
+                        </m:num>
+                        <m:den>
+                          <m:r>
+                            <a:rPr lang="en-US" i="1">
+                              <a:latin typeface="Cambria Math"/>
+                            </a:rPr>
+                            <m:t>𝑑𝑥</m:t>
+                          </m:r>
+                        </m:den>
+                      </m:f>
+                      <m:r>
+                        <a:rPr lang="en-US" i="1">
+                          <a:latin typeface="Cambria Math"/>
+                        </a:rPr>
+                        <m:t>𝑓</m:t>
+                      </m:r>
+                      <m:r>
+                        <a:rPr lang="en-US" i="1">
+                          <a:latin typeface="Cambria Math"/>
+                        </a:rPr>
+                        <m:t>(</m:t>
+                      </m:r>
+                      <m:r>
+                        <a:rPr lang="en-US" i="1">
+                          <a:latin typeface="Cambria Math"/>
+                        </a:rPr>
+                        <m:t>𝑦𝑖</m:t>
+                      </m:r>
+                      <m:r>
+                        <a:rPr lang="en-US" i="1">
+                          <a:latin typeface="Cambria Math"/>
+                        </a:rPr>
+                        <m:t>)</m:t>
+                      </m:r>
+                    </m:oMath>
+                  </m:oMathPara>
+                </a14:m>
+                <a:endParaRPr lang="en-US" i="1" dirty="0"/>
+              </a:p>
+            </p:txBody>
+          </p:sp>
+        </mc:Choice>
+        <mc:Fallback>
+          <p:sp>
+            <p:nvSpPr>
+              <p:cNvPr id="10" name="Rectangle 9"/>
+              <p:cNvSpPr>
+                <a:spLocks noRot="1" noChangeAspect="1" noMove="1" noResize="1" noEditPoints="1" noAdjustHandles="1" noChangeArrowheads="1" noChangeShapeType="1" noTextEdit="1"/>
+              </p:cNvSpPr>
+              <p:nvPr/>
+            </p:nvSpPr>
+            <p:spPr>
+              <a:xfrm>
+                <a:off x="436681" y="4808477"/>
+                <a:ext cx="3310137" cy="618246"/>
+              </a:xfrm>
+              <a:prstGeom prst="rect">
+                <a:avLst/>
+              </a:prstGeom>
+              <a:blipFill rotWithShape="1">
+                <a:blip r:embed="rId7"/>
+                <a:stretch>
+                  <a:fillRect/>
+                </a:stretch>
+              </a:blipFill>
+            </p:spPr>
+            <p:txBody>
+              <a:bodyPr/>
+              <a:lstStyle/>
+              <a:p>
+                <a:r>
+                  <a:rPr lang="en-US">
+                    <a:noFill/>
+                  </a:rPr>
+                  <a:t> </a:t>
+                </a:r>
+              </a:p>
+            </p:txBody>
+          </p:sp>
+        </mc:Fallback>
+      </mc:AlternateContent>
+      <mc:AlternateContent xmlns:mc="http://schemas.openxmlformats.org/markup-compatibility/2006">
+        <mc:Choice xmlns:a14="http://schemas.microsoft.com/office/drawing/2010/main" Requires="a14">
+          <p:sp>
+            <p:nvSpPr>
+              <p:cNvPr id="11" name="Rectangle 10"/>
+              <p:cNvSpPr/>
+              <p:nvPr/>
+            </p:nvSpPr>
+            <p:spPr>
+              <a:xfrm>
+                <a:off x="436681" y="4439145"/>
+                <a:ext cx="1483548" cy="369332"/>
+              </a:xfrm>
+              <a:prstGeom prst="rect">
+                <a:avLst/>
+              </a:prstGeom>
+            </p:spPr>
+            <p:txBody>
+              <a:bodyPr wrap="none">
+                <a:spAutoFit/>
+              </a:bodyPr>
+              <a:lstStyle/>
+              <a:p>
+                <a14:m>
+                  <m:oMathPara xmlns:m="http://schemas.openxmlformats.org/officeDocument/2006/math">
+                    <m:oMathParaPr>
+                      <m:jc m:val="centerGroup"/>
+                    </m:oMathParaPr>
+                    <m:oMath xmlns:m="http://schemas.openxmlformats.org/officeDocument/2006/math">
+                      <m:sSup>
+                        <m:sSupPr>
+                          <m:ctrlPr>
+                            <a:rPr lang="en-US" i="1">
+                              <a:latin typeface="Cambria Math"/>
+                            </a:rPr>
+                          </m:ctrlPr>
+                        </m:sSupPr>
+                        <m:e>
+                          <m:r>
+                            <a:rPr lang="en-US" i="1">
+                              <a:latin typeface="Cambria Math"/>
+                            </a:rPr>
+                            <m:t>(</m:t>
+                          </m:r>
+                          <m:r>
+                            <a:rPr lang="en-US" i="1">
+                              <a:latin typeface="Cambria Math"/>
+                            </a:rPr>
+                            <m:t>𝑦𝑖</m:t>
+                          </m:r>
+                          <m:r>
+                            <a:rPr lang="en-US" i="1">
+                              <a:latin typeface="Cambria Math"/>
+                            </a:rPr>
+                            <m:t>)</m:t>
+                          </m:r>
+                        </m:e>
+                        <m:sup>
+                          <m:r>
+                            <a:rPr lang="en-US" i="1">
+                              <a:latin typeface="Cambria Math"/>
+                            </a:rPr>
+                            <m:t>′</m:t>
+                          </m:r>
+                        </m:sup>
+                      </m:sSup>
+                      <m:r>
+                        <a:rPr lang="en-US" i="1">
+                          <a:latin typeface="Cambria Math"/>
+                        </a:rPr>
+                        <m:t>=</m:t>
+                      </m:r>
+                      <m:r>
+                        <a:rPr lang="en-US" i="1">
+                          <a:latin typeface="Cambria Math"/>
+                        </a:rPr>
+                        <m:t>𝑓</m:t>
+                      </m:r>
+                      <m:r>
+                        <a:rPr lang="en-US" i="1">
+                          <a:latin typeface="Cambria Math"/>
+                        </a:rPr>
+                        <m:t>(</m:t>
+                      </m:r>
+                      <m:r>
+                        <a:rPr lang="en-US" i="1">
+                          <a:latin typeface="Cambria Math"/>
+                        </a:rPr>
+                        <m:t>𝑦𝑖</m:t>
+                      </m:r>
+                      <m:r>
+                        <a:rPr lang="en-US" i="1">
+                          <a:latin typeface="Cambria Math"/>
+                        </a:rPr>
+                        <m:t>)</m:t>
+                      </m:r>
+                    </m:oMath>
+                  </m:oMathPara>
+                </a14:m>
+                <a:endParaRPr lang="en-US" i="1" dirty="0"/>
+              </a:p>
+            </p:txBody>
+          </p:sp>
+        </mc:Choice>
+        <mc:Fallback>
+          <p:sp>
+            <p:nvSpPr>
+              <p:cNvPr id="11" name="Rectangle 10"/>
+              <p:cNvSpPr>
+                <a:spLocks noRot="1" noChangeAspect="1" noMove="1" noResize="1" noEditPoints="1" noAdjustHandles="1" noChangeArrowheads="1" noChangeShapeType="1" noTextEdit="1"/>
+              </p:cNvSpPr>
+              <p:nvPr/>
+            </p:nvSpPr>
+            <p:spPr>
+              <a:xfrm>
+                <a:off x="436681" y="4439145"/>
+                <a:ext cx="1483548" cy="369332"/>
+              </a:xfrm>
+              <a:prstGeom prst="rect">
+                <a:avLst/>
+              </a:prstGeom>
+              <a:blipFill rotWithShape="1">
+                <a:blip r:embed="rId8"/>
+                <a:stretch>
+                  <a:fillRect b="-11475"/>
+                </a:stretch>
+              </a:blipFill>
+            </p:spPr>
+            <p:txBody>
+              <a:bodyPr/>
+              <a:lstStyle/>
+              <a:p>
+                <a:r>
+                  <a:rPr lang="en-US">
+                    <a:noFill/>
+                  </a:rPr>
+                  <a:t> </a:t>
+                </a:r>
+              </a:p>
+            </p:txBody>
+          </p:sp>
+        </mc:Fallback>
+      </mc:AlternateContent>
+      <mc:AlternateContent xmlns:mc="http://schemas.openxmlformats.org/markup-compatibility/2006">
+        <mc:Choice xmlns:a14="http://schemas.microsoft.com/office/drawing/2010/main" Requires="a14">
+          <p:sp>
+            <p:nvSpPr>
+              <p:cNvPr id="12" name="Rectangle 11"/>
+              <p:cNvSpPr/>
+              <p:nvPr/>
+            </p:nvSpPr>
+            <p:spPr>
+              <a:xfrm>
+                <a:off x="0" y="2852936"/>
+                <a:ext cx="4392488" cy="1447897"/>
+              </a:xfrm>
+              <a:prstGeom prst="rect">
+                <a:avLst/>
+              </a:prstGeom>
+            </p:spPr>
+            <p:txBody>
+              <a:bodyPr wrap="square">
+                <a:spAutoFit/>
+              </a:bodyPr>
+              <a:lstStyle/>
+              <a:p>
+                <a14:m>
+                  <m:oMathPara xmlns:m="http://schemas.openxmlformats.org/officeDocument/2006/math">
+                    <m:oMathParaPr>
+                      <m:jc m:val="centerGroup"/>
+                    </m:oMathParaPr>
+                    <m:oMath xmlns:m="http://schemas.openxmlformats.org/officeDocument/2006/math">
+                      <m:sSub>
+                        <m:sSubPr>
+                          <m:ctrlPr>
+                            <a:rPr lang="en-US" i="1" smtClean="0">
+                              <a:latin typeface="Cambria Math"/>
+                            </a:rPr>
+                          </m:ctrlPr>
+                        </m:sSubPr>
+                        <m:e>
+                          <m:r>
+                            <a:rPr lang="en-US" b="0" i="1" smtClean="0">
+                              <a:latin typeface="Cambria Math"/>
+                            </a:rPr>
+                            <m:t>𝑦</m:t>
+                          </m:r>
+                        </m:e>
+                        <m:sub>
+                          <m:r>
+                            <a:rPr lang="en-US" b="0" i="1" smtClean="0">
+                              <a:latin typeface="Cambria Math"/>
+                            </a:rPr>
+                            <m:t>𝑖</m:t>
+                          </m:r>
+                          <m:r>
+                            <a:rPr lang="en-US" b="0" i="1" smtClean="0">
+                              <a:latin typeface="Cambria Math"/>
+                            </a:rPr>
+                            <m:t>+1</m:t>
+                          </m:r>
+                        </m:sub>
+                      </m:sSub>
+                      <m:r>
+                        <a:rPr lang="en-US" i="1">
+                          <a:latin typeface="Cambria Math"/>
+                        </a:rPr>
+                        <m:t>=</m:t>
+                      </m:r>
+                      <m:r>
+                        <a:rPr lang="en-US" i="1">
+                          <a:latin typeface="Cambria Math"/>
+                        </a:rPr>
+                        <m:t>𝑦𝑖</m:t>
+                      </m:r>
+                      <m:r>
+                        <a:rPr lang="en-US" i="1">
+                          <a:latin typeface="Cambria Math"/>
+                        </a:rPr>
+                        <m:t>+</m:t>
+                      </m:r>
+                      <m:r>
+                        <a:rPr lang="en-US" i="1">
+                          <a:latin typeface="Cambria Math"/>
+                        </a:rPr>
+                        <m:t>h</m:t>
+                      </m:r>
+                      <m:r>
+                        <a:rPr lang="en-US" i="1">
+                          <a:latin typeface="Cambria Math"/>
+                        </a:rPr>
+                        <m:t>(</m:t>
+                      </m:r>
+                      <m:r>
+                        <a:rPr lang="en-US" i="1">
+                          <a:latin typeface="Cambria Math"/>
+                        </a:rPr>
+                        <m:t>𝑦𝑖</m:t>
+                      </m:r>
+                      <m:r>
+                        <a:rPr lang="en-US" i="1">
+                          <a:latin typeface="Cambria Math"/>
+                        </a:rPr>
+                        <m:t>)′+</m:t>
+                      </m:r>
+                      <m:f>
+                        <m:fPr>
+                          <m:ctrlPr>
+                            <a:rPr lang="en-US" i="1">
+                              <a:latin typeface="Cambria Math"/>
+                            </a:rPr>
+                          </m:ctrlPr>
+                        </m:fPr>
+                        <m:num>
+                          <m:r>
+                            <a:rPr lang="en-US" i="1">
+                              <a:latin typeface="Cambria Math"/>
+                            </a:rPr>
+                            <m:t>h</m:t>
+                          </m:r>
+                          <m:r>
+                            <a:rPr lang="en-US" i="1" baseline="30000">
+                              <a:latin typeface="Cambria Math"/>
+                            </a:rPr>
+                            <m:t>2</m:t>
+                          </m:r>
+                          <m:sSup>
+                            <m:sSupPr>
+                              <m:ctrlPr>
+                                <a:rPr lang="en-US" i="1">
+                                  <a:latin typeface="Cambria Math"/>
+                                </a:rPr>
+                              </m:ctrlPr>
+                            </m:sSupPr>
+                            <m:e>
+                              <m:r>
+                                <a:rPr lang="en-US" i="1">
+                                  <a:latin typeface="Cambria Math"/>
+                                </a:rPr>
+                                <m:t>(</m:t>
+                              </m:r>
+                              <m:r>
+                                <a:rPr lang="en-US" i="1">
+                                  <a:latin typeface="Cambria Math"/>
+                                </a:rPr>
+                                <m:t>𝑦𝑖</m:t>
+                              </m:r>
+                              <m:r>
+                                <a:rPr lang="en-US" i="1">
+                                  <a:latin typeface="Cambria Math"/>
+                                </a:rPr>
+                                <m:t>)</m:t>
+                              </m:r>
+                            </m:e>
+                            <m:sup>
+                              <m:r>
+                                <a:rPr lang="en-US" i="1">
+                                  <a:latin typeface="Cambria Math"/>
+                                </a:rPr>
+                                <m:t>′′</m:t>
+                              </m:r>
+                            </m:sup>
+                          </m:sSup>
+                          <m:r>
+                            <a:rPr lang="en-US" i="1" baseline="-25000">
+                              <a:latin typeface="Cambria Math"/>
+                            </a:rPr>
+                            <m:t>𝑖</m:t>
+                          </m:r>
+                        </m:num>
+                        <m:den>
+                          <m:r>
+                            <a:rPr lang="en-US" i="1">
+                              <a:latin typeface="Cambria Math"/>
+                            </a:rPr>
+                            <m:t>2</m:t>
+                          </m:r>
+                        </m:den>
+                      </m:f>
+                      <m:r>
+                        <a:rPr lang="en-US" i="1">
+                          <a:latin typeface="Cambria Math"/>
+                        </a:rPr>
+                        <m:t>+</m:t>
+                      </m:r>
+                    </m:oMath>
+                  </m:oMathPara>
+                </a14:m>
+                <a:endParaRPr lang="en-US" i="1" dirty="0" smtClean="0"/>
+              </a:p>
+              <a:p>
+                <a:endParaRPr lang="en-US" i="1" dirty="0"/>
+              </a:p>
+              <a:p>
+                <a14:m>
+                  <m:oMathPara xmlns:m="http://schemas.openxmlformats.org/officeDocument/2006/math">
+                    <m:oMathParaPr>
+                      <m:jc m:val="centerGroup"/>
+                    </m:oMathParaPr>
+                    <m:oMath xmlns:m="http://schemas.openxmlformats.org/officeDocument/2006/math">
+                      <m:r>
+                        <a:rPr lang="en-US" b="0" i="1" smtClean="0">
+                          <a:latin typeface="Cambria Math"/>
+                        </a:rPr>
+                        <m:t>                    </m:t>
+                      </m:r>
+                      <m:r>
+                        <a:rPr lang="en-US" i="1" smtClean="0">
+                          <a:latin typeface="Cambria Math"/>
+                        </a:rPr>
+                        <m:t>+</m:t>
+                      </m:r>
+                      <m:f>
+                        <m:fPr>
+                          <m:ctrlPr>
+                            <a:rPr lang="en-US" i="1">
+                              <a:latin typeface="Cambria Math"/>
+                            </a:rPr>
+                          </m:ctrlPr>
+                        </m:fPr>
+                        <m:num>
+                          <m:r>
+                            <a:rPr lang="en-US" i="1">
+                              <a:latin typeface="Cambria Math"/>
+                            </a:rPr>
+                            <m:t>h</m:t>
+                          </m:r>
+                          <m:r>
+                            <a:rPr lang="en-US" i="1" baseline="30000">
+                              <a:latin typeface="Cambria Math"/>
+                            </a:rPr>
+                            <m:t>3</m:t>
+                          </m:r>
+                          <m:sSup>
+                            <m:sSupPr>
+                              <m:ctrlPr>
+                                <a:rPr lang="en-US" i="1">
+                                  <a:latin typeface="Cambria Math"/>
+                                </a:rPr>
+                              </m:ctrlPr>
+                            </m:sSupPr>
+                            <m:e>
+                              <m:r>
+                                <a:rPr lang="en-US" i="1">
+                                  <a:latin typeface="Cambria Math"/>
+                                </a:rPr>
+                                <m:t>(</m:t>
+                              </m:r>
+                              <m:r>
+                                <a:rPr lang="en-US" i="1">
+                                  <a:latin typeface="Cambria Math"/>
+                                </a:rPr>
+                                <m:t>𝑦𝑖</m:t>
+                              </m:r>
+                              <m:r>
+                                <a:rPr lang="en-US" i="1">
+                                  <a:latin typeface="Cambria Math"/>
+                                </a:rPr>
+                                <m:t>)</m:t>
+                              </m:r>
+                            </m:e>
+                            <m:sup>
+                              <m:r>
+                                <a:rPr lang="en-US" i="1">
+                                  <a:latin typeface="Cambria Math"/>
+                                </a:rPr>
+                                <m:t>′′′</m:t>
+                              </m:r>
+                            </m:sup>
+                          </m:sSup>
+                        </m:num>
+                        <m:den>
+                          <m:r>
+                            <a:rPr lang="en-US" i="1">
+                              <a:latin typeface="Cambria Math"/>
+                            </a:rPr>
+                            <m:t>6</m:t>
+                          </m:r>
+                        </m:den>
+                      </m:f>
+                      <m:r>
+                        <a:rPr lang="en-US" i="1">
+                          <a:latin typeface="Cambria Math"/>
+                        </a:rPr>
+                        <m:t>+</m:t>
+                      </m:r>
+                      <m:f>
+                        <m:fPr>
+                          <m:ctrlPr>
+                            <a:rPr lang="en-US" i="1">
+                              <a:latin typeface="Cambria Math"/>
+                            </a:rPr>
+                          </m:ctrlPr>
+                        </m:fPr>
+                        <m:num>
+                          <m:r>
+                            <a:rPr lang="en-US" i="1">
+                              <a:latin typeface="Cambria Math"/>
+                            </a:rPr>
+                            <m:t>h</m:t>
+                          </m:r>
+                          <m:r>
+                            <a:rPr lang="en-US" i="1" baseline="30000">
+                              <a:latin typeface="Cambria Math"/>
+                            </a:rPr>
+                            <m:t>4</m:t>
+                          </m:r>
+                          <m:sSup>
+                            <m:sSupPr>
+                              <m:ctrlPr>
+                                <a:rPr lang="en-US" i="1">
+                                  <a:latin typeface="Cambria Math"/>
+                                </a:rPr>
+                              </m:ctrlPr>
+                            </m:sSupPr>
+                            <m:e>
+                              <m:d>
+                                <m:dPr>
+                                  <m:ctrlPr>
+                                    <a:rPr lang="en-US" i="1">
+                                      <a:latin typeface="Cambria Math"/>
+                                    </a:rPr>
+                                  </m:ctrlPr>
+                                </m:dPr>
+                                <m:e>
+                                  <m:r>
+                                    <a:rPr lang="en-US" i="1">
+                                      <a:latin typeface="Cambria Math"/>
+                                    </a:rPr>
+                                    <m:t>𝑦</m:t>
+                                  </m:r>
+                                  <m:r>
+                                    <a:rPr lang="en-US" i="1" baseline="-25000">
+                                      <a:latin typeface="Cambria Math"/>
+                                    </a:rPr>
+                                    <m:t>𝑖</m:t>
+                                  </m:r>
+                                </m:e>
+                              </m:d>
+                            </m:e>
+                            <m:sup>
+                              <m:r>
+                                <a:rPr lang="en-US" i="1">
+                                  <a:latin typeface="Cambria Math"/>
+                                </a:rPr>
+                                <m:t>′′′′</m:t>
+                              </m:r>
+                            </m:sup>
+                          </m:sSup>
+                        </m:num>
+                        <m:den>
+                          <m:r>
+                            <a:rPr lang="en-US" i="1">
+                              <a:latin typeface="Cambria Math"/>
+                            </a:rPr>
+                            <m:t>24</m:t>
+                          </m:r>
+                        </m:den>
+                      </m:f>
+                    </m:oMath>
+                  </m:oMathPara>
+                </a14:m>
+                <a:endParaRPr lang="en-US" dirty="0"/>
+              </a:p>
+            </p:txBody>
+          </p:sp>
+        </mc:Choice>
+        <mc:Fallback>
+          <p:sp>
+            <p:nvSpPr>
+              <p:cNvPr id="12" name="Rectangle 11"/>
+              <p:cNvSpPr>
+                <a:spLocks noRot="1" noChangeAspect="1" noMove="1" noResize="1" noEditPoints="1" noAdjustHandles="1" noChangeArrowheads="1" noChangeShapeType="1" noTextEdit="1"/>
+              </p:cNvSpPr>
+              <p:nvPr/>
+            </p:nvSpPr>
+            <p:spPr>
+              <a:xfrm>
+                <a:off x="0" y="2852936"/>
+                <a:ext cx="4392488" cy="1447897"/>
+              </a:xfrm>
+              <a:prstGeom prst="rect">
+                <a:avLst/>
+              </a:prstGeom>
+              <a:blipFill rotWithShape="1">
+                <a:blip r:embed="rId9"/>
+                <a:stretch>
+                  <a:fillRect/>
+                </a:stretch>
+              </a:blipFill>
+            </p:spPr>
+            <p:txBody>
+              <a:bodyPr/>
+              <a:lstStyle/>
+              <a:p>
+                <a:r>
+                  <a:rPr lang="en-US">
+                    <a:noFill/>
+                  </a:rPr>
+                  <a:t> </a:t>
+                </a:r>
+              </a:p>
+            </p:txBody>
+          </p:sp>
+        </mc:Fallback>
+      </mc:AlternateContent>
+    </p:spTree>
+    <p:extLst>
+      <p:ext uri="{BB962C8B-B14F-4D97-AF65-F5344CB8AC3E}">
+        <p14:creationId xmlns:p14="http://schemas.microsoft.com/office/powerpoint/2010/main" val="883032681"/>
+      </p:ext>
+    </p:extLst>
+  </p:cSld>
+  <p:clrMapOvr>
+    <a:masterClrMapping/>
+  </p:clrMapOvr>
+  <p:timing>
+    <p:tnLst>
+      <p:par>
+        <p:cTn id="1" dur="indefinite" restart="never" nodeType="tmRoot"/>
+      </p:par>
+    </p:tnLst>
+  </p:timing>
+</p:sld>
+</file>
+
+<file path=ppt/slides/slide11.xml><?xml version="1.0" encoding="utf-8"?>
+<p:sld xmlns:a="http://schemas.openxmlformats.org/drawingml/2006/main" xmlns:r="http://schemas.openxmlformats.org/officeDocument/2006/relationships" xmlns:p="http://schemas.openxmlformats.org/presentationml/2006/main">
+  <p:cSld>
+    <p:spTree>
+      <p:nvGrpSpPr>
+        <p:cNvPr id="1" name=""/>
+        <p:cNvGrpSpPr/>
+        <p:nvPr/>
+      </p:nvGrpSpPr>
+      <p:grpSpPr>
+        <a:xfrm>
+          <a:off x="0" y="0"/>
+          <a:ext cx="0" cy="0"/>
+          <a:chOff x="0" y="0"/>
+          <a:chExt cx="0" cy="0"/>
+        </a:xfrm>
+      </p:grpSpPr>
+      <p:sp>
+        <p:nvSpPr>
           <p:cNvPr id="5" name="Title 4"/>
           <p:cNvSpPr>
             <a:spLocks noGrp="1"/>
@@ -3770,12 +5713,23 @@
             <p:ph type="title"/>
           </p:nvPr>
         </p:nvSpPr>
-        <p:spPr/>
+        <p:spPr>
+          <a:xfrm>
+            <a:off x="611560" y="274638"/>
+            <a:ext cx="8075240" cy="778098"/>
+          </a:xfrm>
+        </p:spPr>
         <p:txBody>
-          <a:bodyPr/>
+          <a:bodyPr>
+            <a:normAutofit/>
+          </a:bodyPr>
           <a:lstStyle/>
           <a:p>
-            <a:endParaRPr lang="en-US"/>
+            <a:r>
+              <a:rPr lang="bg-BG" sz="4000" dirty="0"/>
+              <a:t>Ясно изразена епидемия</a:t>
+            </a:r>
+            <a:endParaRPr lang="en-US" sz="4000" dirty="0"/>
           </a:p>
         </p:txBody>
       </p:sp>
@@ -3837,95 +5791,101 @@
           </a:xfrm>
         </p:spPr>
       </p:pic>
+      <p:sp>
+        <p:nvSpPr>
+          <p:cNvPr id="2" name="Rectangle 1"/>
+          <p:cNvSpPr/>
+          <p:nvPr/>
+        </p:nvSpPr>
+        <p:spPr>
+          <a:xfrm>
+            <a:off x="755576" y="1430861"/>
+            <a:ext cx="3888432" cy="646331"/>
+          </a:xfrm>
+          <a:prstGeom prst="rect">
+            <a:avLst/>
+          </a:prstGeom>
+        </p:spPr>
+        <p:txBody>
+          <a:bodyPr wrap="square">
+            <a:spAutoFit/>
+          </a:bodyPr>
+          <a:lstStyle/>
+          <a:p>
+            <a:r>
+              <a:rPr lang="bg-BG" dirty="0" smtClean="0"/>
+              <a:t>Начално условие и параметри:</a:t>
+            </a:r>
+          </a:p>
+          <a:p>
+            <a:r>
+              <a:rPr lang="en-US" i="1" dirty="0" smtClean="0"/>
+              <a:t>S</a:t>
+            </a:r>
+            <a:r>
+              <a:rPr lang="en-US" i="1" baseline="-25000" dirty="0" smtClean="0"/>
+              <a:t>0</a:t>
+            </a:r>
+            <a:r>
+              <a:rPr lang="en-US" baseline="-25000" dirty="0" smtClean="0"/>
+              <a:t> </a:t>
+            </a:r>
+            <a:r>
+              <a:rPr lang="en-US" dirty="0" smtClean="0"/>
+              <a:t>= 763, </a:t>
+            </a:r>
+            <a:r>
+              <a:rPr lang="en-US" i="1" dirty="0" smtClean="0"/>
+              <a:t>I</a:t>
+            </a:r>
+            <a:r>
+              <a:rPr lang="en-US" i="1" baseline="-25000" dirty="0" smtClean="0"/>
+              <a:t>0</a:t>
+            </a:r>
+            <a:r>
+              <a:rPr lang="en-US" dirty="0" smtClean="0"/>
+              <a:t> = 1</a:t>
+            </a:r>
+            <a:r>
+              <a:rPr lang="bg-BG" dirty="0" smtClean="0"/>
+              <a:t>, </a:t>
+            </a:r>
+            <a:r>
+              <a:rPr lang="en-US" i="1" dirty="0" err="1" smtClean="0"/>
+              <a:t>S</a:t>
+            </a:r>
+            <a:r>
+              <a:rPr lang="en-US" i="1" baseline="-25000" dirty="0" err="1" smtClean="0"/>
+              <a:t>c</a:t>
+            </a:r>
+            <a:r>
+              <a:rPr lang="en-US" dirty="0" smtClean="0"/>
+              <a:t> = 202,</a:t>
+            </a:r>
+            <a:r>
+              <a:rPr lang="bg-BG" dirty="0" smtClean="0"/>
+              <a:t> </a:t>
+            </a:r>
+            <a:r>
+              <a:rPr lang="en-US" i="1" dirty="0" smtClean="0"/>
+              <a:t>r</a:t>
+            </a:r>
+            <a:r>
+              <a:rPr lang="en-US" dirty="0" smtClean="0"/>
+              <a:t> = 2.18*10</a:t>
+            </a:r>
+            <a:r>
+              <a:rPr lang="en-US" baseline="30000" dirty="0" smtClean="0"/>
+              <a:t>-3</a:t>
+            </a:r>
+            <a:endParaRPr lang="en-US" baseline="30000" dirty="0"/>
+          </a:p>
+        </p:txBody>
+      </p:sp>
     </p:spTree>
     <p:extLst>
       <p:ext uri="{BB962C8B-B14F-4D97-AF65-F5344CB8AC3E}">
         <p14:creationId xmlns:p14="http://schemas.microsoft.com/office/powerpoint/2010/main" val="4147537243"/>
-      </p:ext>
-    </p:extLst>
-  </p:cSld>
-  <p:clrMapOvr>
-    <a:masterClrMapping/>
-  </p:clrMapOvr>
-  <p:timing>
-    <p:tnLst>
-      <p:par>
-        <p:cTn id="1" dur="indefinite" restart="never" nodeType="tmRoot"/>
-      </p:par>
-    </p:tnLst>
-  </p:timing>
-</p:sld>
-</file>
-
-<file path=ppt/slides/slide11.xml><?xml version="1.0" encoding="utf-8"?>
-<p:sld xmlns:a="http://schemas.openxmlformats.org/drawingml/2006/main" xmlns:r="http://schemas.openxmlformats.org/officeDocument/2006/relationships" xmlns:p="http://schemas.openxmlformats.org/presentationml/2006/main">
-  <p:cSld>
-    <p:spTree>
-      <p:nvGrpSpPr>
-        <p:cNvPr id="1" name=""/>
-        <p:cNvGrpSpPr/>
-        <p:nvPr/>
-      </p:nvGrpSpPr>
-      <p:grpSpPr>
-        <a:xfrm>
-          <a:off x="0" y="0"/>
-          <a:ext cx="0" cy="0"/>
-          <a:chOff x="0" y="0"/>
-          <a:chExt cx="0" cy="0"/>
-        </a:xfrm>
-      </p:grpSpPr>
-      <p:sp>
-        <p:nvSpPr>
-          <p:cNvPr id="2" name="Title 1"/>
-          <p:cNvSpPr>
-            <a:spLocks noGrp="1"/>
-          </p:cNvSpPr>
-          <p:nvPr>
-            <p:ph type="title"/>
-          </p:nvPr>
-        </p:nvSpPr>
-        <p:spPr/>
-        <p:txBody>
-          <a:bodyPr/>
-          <a:lstStyle/>
-          <a:p>
-            <a:endParaRPr lang="en-US"/>
-          </a:p>
-        </p:txBody>
-      </p:sp>
-      <p:pic>
-        <p:nvPicPr>
-          <p:cNvPr id="4" name="Content Placeholder 3"/>
-          <p:cNvPicPr>
-            <a:picLocks noGrp="1" noChangeAspect="1"/>
-          </p:cNvPicPr>
-          <p:nvPr>
-            <p:ph idx="1"/>
-          </p:nvPr>
-        </p:nvPicPr>
-        <p:blipFill>
-          <a:blip r:embed="rId2">
-            <a:extLst>
-              <a:ext uri="{28A0092B-C50C-407E-A947-70E740481C1C}">
-                <a14:useLocalDpi xmlns:a14="http://schemas.microsoft.com/office/drawing/2010/main" val="0"/>
-              </a:ext>
-            </a:extLst>
-          </a:blip>
-          <a:stretch>
-            <a:fillRect/>
-          </a:stretch>
-        </p:blipFill>
-        <p:spPr>
-          <a:xfrm>
-            <a:off x="2011680" y="1942941"/>
-            <a:ext cx="5120640" cy="3840480"/>
-          </a:xfrm>
-        </p:spPr>
-      </p:pic>
-    </p:spTree>
-    <p:extLst>
-      <p:ext uri="{BB962C8B-B14F-4D97-AF65-F5344CB8AC3E}">
-        <p14:creationId xmlns:p14="http://schemas.microsoft.com/office/powerpoint/2010/main" val="705551336"/>
       </p:ext>
     </p:extLst>
   </p:cSld>
@@ -3959,9 +5919,38 @@
           <a:chExt cx="0" cy="0"/>
         </a:xfrm>
       </p:grpSpPr>
+      <p:pic>
+        <p:nvPicPr>
+          <p:cNvPr id="4" name="Content Placeholder 3"/>
+          <p:cNvPicPr>
+            <a:picLocks noGrp="1" noChangeAspect="1"/>
+          </p:cNvPicPr>
+          <p:nvPr>
+            <p:ph idx="1"/>
+          </p:nvPr>
+        </p:nvPicPr>
+        <p:blipFill>
+          <a:blip r:embed="rId2">
+            <a:extLst>
+              <a:ext uri="{28A0092B-C50C-407E-A947-70E740481C1C}">
+                <a14:useLocalDpi xmlns:a14="http://schemas.microsoft.com/office/drawing/2010/main" val="0"/>
+              </a:ext>
+            </a:extLst>
+          </a:blip>
+          <a:stretch>
+            <a:fillRect/>
+          </a:stretch>
+        </p:blipFill>
+        <p:spPr>
+          <a:xfrm>
+            <a:off x="2011680" y="1942941"/>
+            <a:ext cx="5120640" cy="3840480"/>
+          </a:xfrm>
+        </p:spPr>
+      </p:pic>
       <p:sp>
         <p:nvSpPr>
-          <p:cNvPr id="2" name="Title 1"/>
+          <p:cNvPr id="7" name="Title 4"/>
           <p:cNvSpPr>
             <a:spLocks noGrp="1"/>
           </p:cNvSpPr>
@@ -3969,15 +5958,63 @@
             <p:ph type="title"/>
           </p:nvPr>
         </p:nvSpPr>
-        <p:spPr/>
+        <p:spPr>
+          <a:xfrm>
+            <a:off x="611560" y="274638"/>
+            <a:ext cx="8075240" cy="778098"/>
+          </a:xfrm>
+        </p:spPr>
         <p:txBody>
-          <a:bodyPr/>
+          <a:bodyPr>
+            <a:normAutofit/>
+          </a:bodyPr>
           <a:lstStyle/>
           <a:p>
-            <a:endParaRPr lang="en-US"/>
+            <a:r>
+              <a:rPr lang="bg-BG" sz="4000" dirty="0"/>
+              <a:t>Ясно изразена епидемия</a:t>
+            </a:r>
+            <a:endParaRPr lang="en-US" sz="4000" dirty="0"/>
           </a:p>
         </p:txBody>
       </p:sp>
+    </p:spTree>
+    <p:extLst>
+      <p:ext uri="{BB962C8B-B14F-4D97-AF65-F5344CB8AC3E}">
+        <p14:creationId xmlns:p14="http://schemas.microsoft.com/office/powerpoint/2010/main" val="705551336"/>
+      </p:ext>
+    </p:extLst>
+  </p:cSld>
+  <p:clrMapOvr>
+    <a:masterClrMapping/>
+  </p:clrMapOvr>
+  <p:timing>
+    <p:tnLst>
+      <p:par>
+        <p:cTn id="1" dur="indefinite" restart="never" nodeType="tmRoot"/>
+      </p:par>
+    </p:tnLst>
+  </p:timing>
+</p:sld>
+</file>
+
+<file path=ppt/slides/slide13.xml><?xml version="1.0" encoding="utf-8"?>
+<p:sld xmlns:a="http://schemas.openxmlformats.org/drawingml/2006/main" xmlns:r="http://schemas.openxmlformats.org/officeDocument/2006/relationships" xmlns:p="http://schemas.openxmlformats.org/presentationml/2006/main">
+  <p:cSld>
+    <p:spTree>
+      <p:nvGrpSpPr>
+        <p:cNvPr id="1" name=""/>
+        <p:cNvGrpSpPr/>
+        <p:nvPr/>
+      </p:nvGrpSpPr>
+      <p:grpSpPr>
+        <a:xfrm>
+          <a:off x="0" y="0"/>
+          <a:ext cx="0" cy="0"/>
+          <a:chOff x="0" y="0"/>
+          <a:chExt cx="0" cy="0"/>
+        </a:xfrm>
+      </p:grpSpPr>
       <p:pic>
         <p:nvPicPr>
           <p:cNvPr id="5" name="Content Placeholder 4"/>
@@ -4036,46 +6073,9 @@
           </a:xfrm>
         </p:spPr>
       </p:pic>
-    </p:spTree>
-    <p:extLst>
-      <p:ext uri="{BB962C8B-B14F-4D97-AF65-F5344CB8AC3E}">
-        <p14:creationId xmlns:p14="http://schemas.microsoft.com/office/powerpoint/2010/main" val="2466452140"/>
-      </p:ext>
-    </p:extLst>
-  </p:cSld>
-  <p:clrMapOvr>
-    <a:masterClrMapping/>
-  </p:clrMapOvr>
-  <p:timing>
-    <p:tnLst>
-      <p:par>
-        <p:cTn id="1" dur="indefinite" restart="never" nodeType="tmRoot"/>
-      </p:par>
-    </p:tnLst>
-  </p:timing>
-</p:sld>
-</file>
-
-<file path=ppt/slides/slide13.xml><?xml version="1.0" encoding="utf-8"?>
-<p:sld xmlns:a="http://schemas.openxmlformats.org/drawingml/2006/main" xmlns:r="http://schemas.openxmlformats.org/officeDocument/2006/relationships" xmlns:p="http://schemas.openxmlformats.org/presentationml/2006/main">
-  <p:cSld>
-    <p:spTree>
-      <p:nvGrpSpPr>
-        <p:cNvPr id="1" name=""/>
-        <p:cNvGrpSpPr/>
-        <p:nvPr/>
-      </p:nvGrpSpPr>
-      <p:grpSpPr>
-        <a:xfrm>
-          <a:off x="0" y="0"/>
-          <a:ext cx="0" cy="0"/>
-          <a:chOff x="0" y="0"/>
-          <a:chExt cx="0" cy="0"/>
-        </a:xfrm>
-      </p:grpSpPr>
       <p:sp>
         <p:nvSpPr>
-          <p:cNvPr id="2" name="Title 1"/>
+          <p:cNvPr id="7" name="Title 4"/>
           <p:cNvSpPr>
             <a:spLocks noGrp="1"/>
           </p:cNvSpPr>
@@ -4085,46 +6085,134 @@
         </p:nvSpPr>
         <p:spPr/>
         <p:txBody>
-          <a:bodyPr/>
+          <a:bodyPr>
+            <a:normAutofit/>
+          </a:bodyPr>
           <a:lstStyle/>
           <a:p>
-            <a:endParaRPr lang="en-US"/>
+            <a:r>
+              <a:rPr lang="bg-BG" sz="4000" dirty="0" smtClean="0"/>
+              <a:t>Слабо изразена </a:t>
+            </a:r>
+            <a:r>
+              <a:rPr lang="bg-BG" sz="4000" dirty="0"/>
+              <a:t>епидемия</a:t>
+            </a:r>
+            <a:endParaRPr lang="en-US" sz="4000" dirty="0"/>
           </a:p>
         </p:txBody>
       </p:sp>
-      <p:pic>
-        <p:nvPicPr>
-          <p:cNvPr id="5" name="Content Placeholder 4"/>
-          <p:cNvPicPr>
-            <a:picLocks noGrp="1" noChangeAspect="1"/>
-          </p:cNvPicPr>
-          <p:nvPr>
-            <p:ph idx="1"/>
-          </p:nvPr>
-        </p:nvPicPr>
-        <p:blipFill>
-          <a:blip r:embed="rId2">
-            <a:extLst>
-              <a:ext uri="{28A0092B-C50C-407E-A947-70E740481C1C}">
-                <a14:useLocalDpi xmlns:a14="http://schemas.microsoft.com/office/drawing/2010/main" val="0"/>
-              </a:ext>
-            </a:extLst>
-          </a:blip>
-          <a:stretch>
-            <a:fillRect/>
-          </a:stretch>
-        </p:blipFill>
+      <p:sp>
+        <p:nvSpPr>
+          <p:cNvPr id="8" name="Rectangle 7"/>
+          <p:cNvSpPr/>
+          <p:nvPr/>
+        </p:nvSpPr>
         <p:spPr>
           <a:xfrm>
-            <a:off x="2011680" y="1942941"/>
-            <a:ext cx="5120640" cy="3840480"/>
+            <a:off x="755576" y="1556792"/>
+            <a:ext cx="3888432" cy="646331"/>
           </a:xfrm>
+          <a:prstGeom prst="rect">
+            <a:avLst/>
+          </a:prstGeom>
         </p:spPr>
-      </p:pic>
+        <p:txBody>
+          <a:bodyPr wrap="square">
+            <a:spAutoFit/>
+          </a:bodyPr>
+          <a:lstStyle/>
+          <a:p>
+            <a:r>
+              <a:rPr lang="bg-BG" dirty="0" smtClean="0"/>
+              <a:t>Начално условие и параметри:</a:t>
+            </a:r>
+          </a:p>
+          <a:p>
+            <a:r>
+              <a:rPr lang="en-US" i="1" dirty="0" smtClean="0"/>
+              <a:t>S</a:t>
+            </a:r>
+            <a:r>
+              <a:rPr lang="en-US" i="1" baseline="-25000" dirty="0" smtClean="0"/>
+              <a:t>0</a:t>
+            </a:r>
+            <a:r>
+              <a:rPr lang="en-US" baseline="-25000" dirty="0" smtClean="0"/>
+              <a:t> </a:t>
+            </a:r>
+            <a:r>
+              <a:rPr lang="en-US" dirty="0" smtClean="0"/>
+              <a:t>= 76</a:t>
+            </a:r>
+            <a:r>
+              <a:rPr lang="bg-BG" dirty="0" smtClean="0"/>
+              <a:t>0</a:t>
+            </a:r>
+            <a:r>
+              <a:rPr lang="en-US" dirty="0" smtClean="0"/>
+              <a:t>, </a:t>
+            </a:r>
+            <a:r>
+              <a:rPr lang="en-US" i="1" dirty="0" smtClean="0"/>
+              <a:t>I</a:t>
+            </a:r>
+            <a:r>
+              <a:rPr lang="en-US" i="1" baseline="-25000" dirty="0" smtClean="0"/>
+              <a:t>0</a:t>
+            </a:r>
+            <a:r>
+              <a:rPr lang="en-US" dirty="0" smtClean="0"/>
+              <a:t> = </a:t>
+            </a:r>
+            <a:r>
+              <a:rPr lang="bg-BG" dirty="0" smtClean="0"/>
+              <a:t>4, </a:t>
+            </a:r>
+            <a:r>
+              <a:rPr lang="en-US" i="1" dirty="0" err="1" smtClean="0"/>
+              <a:t>S</a:t>
+            </a:r>
+            <a:r>
+              <a:rPr lang="en-US" i="1" baseline="-25000" dirty="0" err="1" smtClean="0"/>
+              <a:t>c</a:t>
+            </a:r>
+            <a:r>
+              <a:rPr lang="en-US" dirty="0" smtClean="0"/>
+              <a:t> = </a:t>
+            </a:r>
+            <a:r>
+              <a:rPr lang="bg-BG" dirty="0" smtClean="0"/>
+              <a:t>740</a:t>
+            </a:r>
+            <a:r>
+              <a:rPr lang="en-US" dirty="0" smtClean="0"/>
+              <a:t>,</a:t>
+            </a:r>
+            <a:r>
+              <a:rPr lang="bg-BG" dirty="0" smtClean="0"/>
+              <a:t> </a:t>
+            </a:r>
+            <a:r>
+              <a:rPr lang="en-US" i="1" dirty="0" smtClean="0"/>
+              <a:t>r</a:t>
+            </a:r>
+            <a:r>
+              <a:rPr lang="en-US" dirty="0" smtClean="0"/>
+              <a:t> = 2.18*10</a:t>
+            </a:r>
+            <a:r>
+              <a:rPr lang="en-US" baseline="30000" dirty="0" smtClean="0"/>
+              <a:t>-3</a:t>
+            </a:r>
+            <a:endParaRPr lang="en-US" baseline="30000" dirty="0"/>
+          </a:p>
+        </p:txBody>
+      </p:sp>
     </p:spTree>
     <p:extLst>
       <p:ext uri="{BB962C8B-B14F-4D97-AF65-F5344CB8AC3E}">
-        <p14:creationId xmlns:p14="http://schemas.microsoft.com/office/powerpoint/2010/main" val="1640652145"/>
+        <p14:creationId xmlns:p14="http://schemas.microsoft.com/office/powerpoint/2010/main" val="2466452140"/>
       </p:ext>
     </p:extLst>
   </p:cSld>
@@ -4158,28 +6246,9 @@
           <a:chExt cx="0" cy="0"/>
         </a:xfrm>
       </p:grpSpPr>
-      <p:sp>
-        <p:nvSpPr>
-          <p:cNvPr id="2" name="Title 1"/>
-          <p:cNvSpPr>
-            <a:spLocks noGrp="1"/>
-          </p:cNvSpPr>
-          <p:nvPr>
-            <p:ph type="title"/>
-          </p:nvPr>
-        </p:nvSpPr>
-        <p:spPr/>
-        <p:txBody>
-          <a:bodyPr/>
-          <a:lstStyle/>
-          <a:p>
-            <a:endParaRPr lang="en-US"/>
-          </a:p>
-        </p:txBody>
-      </p:sp>
       <p:pic>
         <p:nvPicPr>
-          <p:cNvPr id="4" name="Content Placeholder 3"/>
+          <p:cNvPr id="5" name="Content Placeholder 4"/>
           <p:cNvPicPr>
             <a:picLocks noGrp="1" noChangeAspect="1"/>
           </p:cNvPicPr>
@@ -4206,10 +6275,44 @@
           </a:xfrm>
         </p:spPr>
       </p:pic>
+      <p:sp>
+        <p:nvSpPr>
+          <p:cNvPr id="6" name="Title 4"/>
+          <p:cNvSpPr>
+            <a:spLocks noGrp="1"/>
+          </p:cNvSpPr>
+          <p:nvPr>
+            <p:ph type="title"/>
+          </p:nvPr>
+        </p:nvSpPr>
+        <p:spPr>
+          <a:xfrm>
+            <a:off x="457200" y="274638"/>
+            <a:ext cx="8229600" cy="1143000"/>
+          </a:xfrm>
+        </p:spPr>
+        <p:txBody>
+          <a:bodyPr>
+            <a:normAutofit/>
+          </a:bodyPr>
+          <a:lstStyle/>
+          <a:p>
+            <a:r>
+              <a:rPr lang="bg-BG" sz="4000" dirty="0" smtClean="0"/>
+              <a:t>Слабо изразена </a:t>
+            </a:r>
+            <a:r>
+              <a:rPr lang="bg-BG" sz="4000" dirty="0"/>
+              <a:t>епидемия</a:t>
+            </a:r>
+            <a:endParaRPr lang="en-US" sz="4000" dirty="0"/>
+          </a:p>
+        </p:txBody>
+      </p:sp>
     </p:spTree>
     <p:extLst>
       <p:ext uri="{BB962C8B-B14F-4D97-AF65-F5344CB8AC3E}">
-        <p14:creationId xmlns:p14="http://schemas.microsoft.com/office/powerpoint/2010/main" val="3145842483"/>
+        <p14:creationId xmlns:p14="http://schemas.microsoft.com/office/powerpoint/2010/main" val="1640652145"/>
       </p:ext>
     </p:extLst>
   </p:cSld>
@@ -4243,9 +6346,38 @@
           <a:chExt cx="0" cy="0"/>
         </a:xfrm>
       </p:grpSpPr>
+      <p:pic>
+        <p:nvPicPr>
+          <p:cNvPr id="4" name="Content Placeholder 3"/>
+          <p:cNvPicPr>
+            <a:picLocks noGrp="1" noChangeAspect="1"/>
+          </p:cNvPicPr>
+          <p:nvPr>
+            <p:ph idx="1"/>
+          </p:nvPr>
+        </p:nvPicPr>
+        <p:blipFill>
+          <a:blip r:embed="rId2">
+            <a:extLst>
+              <a:ext uri="{28A0092B-C50C-407E-A947-70E740481C1C}">
+                <a14:useLocalDpi xmlns:a14="http://schemas.microsoft.com/office/drawing/2010/main" val="0"/>
+              </a:ext>
+            </a:extLst>
+          </a:blip>
+          <a:stretch>
+            <a:fillRect/>
+          </a:stretch>
+        </p:blipFill>
+        <p:spPr>
+          <a:xfrm>
+            <a:off x="2011680" y="1942941"/>
+            <a:ext cx="5120640" cy="3840480"/>
+          </a:xfrm>
+        </p:spPr>
+      </p:pic>
       <p:sp>
         <p:nvSpPr>
-          <p:cNvPr id="2" name="Title 1"/>
+          <p:cNvPr id="5" name="Title 4"/>
           <p:cNvSpPr>
             <a:spLocks noGrp="1"/>
           </p:cNvSpPr>
@@ -4255,13 +6387,60 @@
         </p:nvSpPr>
         <p:spPr/>
         <p:txBody>
-          <a:bodyPr/>
+          <a:bodyPr>
+            <a:normAutofit/>
+          </a:bodyPr>
           <a:lstStyle/>
           <a:p>
-            <a:endParaRPr lang="en-US"/>
+            <a:r>
+              <a:rPr lang="bg-BG" sz="4000" dirty="0" smtClean="0"/>
+              <a:t>Слабо изразена </a:t>
+            </a:r>
+            <a:r>
+              <a:rPr lang="bg-BG" sz="4000" dirty="0"/>
+              <a:t>епидемия</a:t>
+            </a:r>
+            <a:endParaRPr lang="en-US" sz="4000" dirty="0"/>
           </a:p>
         </p:txBody>
       </p:sp>
+    </p:spTree>
+    <p:extLst>
+      <p:ext uri="{BB962C8B-B14F-4D97-AF65-F5344CB8AC3E}">
+        <p14:creationId xmlns:p14="http://schemas.microsoft.com/office/powerpoint/2010/main" val="3145842483"/>
+      </p:ext>
+    </p:extLst>
+  </p:cSld>
+  <p:clrMapOvr>
+    <a:masterClrMapping/>
+  </p:clrMapOvr>
+  <p:timing>
+    <p:tnLst>
+      <p:par>
+        <p:cTn id="1" dur="indefinite" restart="never" nodeType="tmRoot"/>
+      </p:par>
+    </p:tnLst>
+  </p:timing>
+</p:sld>
+</file>
+
+<file path=ppt/slides/slide16.xml><?xml version="1.0" encoding="utf-8"?>
+<p:sld xmlns:a="http://schemas.openxmlformats.org/drawingml/2006/main" xmlns:r="http://schemas.openxmlformats.org/officeDocument/2006/relationships" xmlns:p="http://schemas.openxmlformats.org/presentationml/2006/main">
+  <p:cSld>
+    <p:spTree>
+      <p:nvGrpSpPr>
+        <p:cNvPr id="1" name=""/>
+        <p:cNvGrpSpPr/>
+        <p:nvPr/>
+      </p:nvGrpSpPr>
+      <p:grpSpPr>
+        <a:xfrm>
+          <a:off x="0" y="0"/>
+          <a:ext cx="0" cy="0"/>
+          <a:chOff x="0" y="0"/>
+          <a:chExt cx="0" cy="0"/>
+        </a:xfrm>
+      </p:grpSpPr>
       <p:pic>
         <p:nvPicPr>
           <p:cNvPr id="5" name="Content Placeholder 4"/>
@@ -4291,6 +6470,40 @@
           </a:xfrm>
         </p:spPr>
       </p:pic>
+      <p:sp>
+        <p:nvSpPr>
+          <p:cNvPr id="4" name="Title 4"/>
+          <p:cNvSpPr>
+            <a:spLocks noGrp="1"/>
+          </p:cNvSpPr>
+          <p:nvPr>
+            <p:ph type="title"/>
+          </p:nvPr>
+        </p:nvSpPr>
+        <p:spPr>
+          <a:xfrm>
+            <a:off x="457200" y="274638"/>
+            <a:ext cx="8229600" cy="1143000"/>
+          </a:xfrm>
+        </p:spPr>
+        <p:txBody>
+          <a:bodyPr>
+            <a:normAutofit/>
+          </a:bodyPr>
+          <a:lstStyle/>
+          <a:p>
+            <a:r>
+              <a:rPr lang="bg-BG" sz="4000" dirty="0" smtClean="0"/>
+              <a:t>Слабо изразена </a:t>
+            </a:r>
+            <a:r>
+              <a:rPr lang="bg-BG" sz="4000" dirty="0"/>
+              <a:t>епидемия</a:t>
+            </a:r>
+            <a:endParaRPr lang="en-US" sz="4000" dirty="0"/>
+          </a:p>
+        </p:txBody>
+      </p:sp>
     </p:spTree>
     <p:extLst>
       <p:ext uri="{BB962C8B-B14F-4D97-AF65-F5344CB8AC3E}">
@@ -4311,7 +6524,7 @@
 </p:sld>
 </file>
 
-<file path=ppt/slides/slide16.xml><?xml version="1.0" encoding="utf-8"?>
+<file path=ppt/slides/slide17.xml><?xml version="1.0" encoding="utf-8"?>
 <p:sld xmlns:a="http://schemas.openxmlformats.org/drawingml/2006/main" xmlns:r="http://schemas.openxmlformats.org/officeDocument/2006/relationships" xmlns:p="http://schemas.openxmlformats.org/presentationml/2006/main">
   <p:cSld>
     <p:spTree>
@@ -4634,7 +6847,7 @@
         <p:nvGraphicFramePr>
           <p:cNvPr id="6148" name="Object 4"/>
           <p:cNvGraphicFramePr>
-            <a:graphicFrameLocks noChangeAspect="1"/>
+            <a:graphicFrameLocks noGrp="1" noChangeAspect="1"/>
           </p:cNvGraphicFramePr>
           <p:nvPr>
             <p:ph sz="quarter" idx="2"/>
@@ -4653,7 +6866,7 @@
           <a:graphicData uri="http://schemas.openxmlformats.org/presentationml/2006/ole">
             <mc:AlternateContent xmlns:mc="http://schemas.openxmlformats.org/markup-compatibility/2006">
               <mc:Choice xmlns:v="urn:schemas-microsoft-com:vml" Requires="v">
-                <p:oleObj spid="_x0000_s2060" name="Équation" r:id="rId3" imgW="2463480" imgH="393480" progId="Equation.3">
+                <p:oleObj spid="_x0000_s2062" name="Équation" r:id="rId3" imgW="2463480" imgH="393480" progId="Equation.3">
                   <p:embed/>
                 </p:oleObj>
               </mc:Choice>
@@ -5029,13 +7242,7 @@
               <a:rPr lang="en-US" sz="2400" dirty="0" smtClean="0">
                 <a:latin typeface="Symbol" pitchFamily="18" charset="2"/>
               </a:rPr>
-              <a:t>  </a:t>
-            </a:r>
-            <a:r>
-              <a:rPr lang="en-US" sz="2400" dirty="0" smtClean="0">
-                <a:latin typeface="Symbol" pitchFamily="18" charset="2"/>
-              </a:rPr>
-              <a:t>=  </a:t>
+              <a:t>  =  </a:t>
             </a:r>
             <a:r>
               <a:rPr lang="bg-BG" sz="2400" i="1" dirty="0" smtClean="0"/>
@@ -5451,8 +7658,8 @@
           </a:p>
         </p:txBody>
       </p:sp>
-      <mc:AlternateContent xmlns:mc="http://schemas.openxmlformats.org/markup-compatibility/2006">
-        <mc:Choice xmlns:a14="http://schemas.microsoft.com/office/drawing/2010/main" Requires="a14">
+      <mc:AlternateContent xmlns:mc="http://schemas.openxmlformats.org/markup-compatibility/2006" xmlns:a14="http://schemas.microsoft.com/office/drawing/2010/main">
+        <mc:Choice Requires="a14">
           <p:sp>
             <p:nvSpPr>
               <p:cNvPr id="6" name="Rectangle 5"/>
@@ -5485,6 +7692,7 @@
                 </a:endParaRPr>
               </a:p>
               <a:p>
+                <a:pPr/>
                 <a14:m>
                   <m:oMathPara xmlns:m="http://schemas.openxmlformats.org/officeDocument/2006/math">
                     <m:oMathParaPr>
@@ -6050,7 +8258,7 @@
             </p:txBody>
           </p:sp>
         </mc:Choice>
-        <mc:Fallback>
+        <mc:Fallback xmlns="">
           <p:sp>
             <p:nvSpPr>
               <p:cNvPr id="6" name="Rectangle 5"/>
@@ -6237,7 +8445,7 @@
         </p:blipFill>
         <p:spPr>
           <a:xfrm>
-            <a:off x="2720194" y="1916832"/>
+            <a:off x="1331640" y="1844824"/>
             <a:ext cx="3960440" cy="4108859"/>
           </a:xfrm>
         </p:spPr>
@@ -6334,18 +8542,22 @@
             </a:r>
             <a:r>
               <a:rPr lang="en-US" sz="2200" i="1" dirty="0"/>
-              <a:t> = I(</a:t>
-            </a:r>
-            <a:r>
-              <a:rPr lang="en-US" sz="2200" i="1" dirty="0" err="1"/>
+              <a:t> = </a:t>
+            </a:r>
+            <a:r>
+              <a:rPr lang="en-US" sz="2200" i="1" dirty="0" smtClean="0"/>
+              <a:t>I(S=</a:t>
+            </a:r>
+            <a:r>
+              <a:rPr lang="en-US" sz="2200" i="1" dirty="0" err="1" smtClean="0"/>
               <a:t>S</a:t>
             </a:r>
             <a:r>
-              <a:rPr lang="en-US" sz="2200" i="1" baseline="-25000" dirty="0" err="1"/>
+              <a:rPr lang="en-US" sz="2200" i="1" baseline="-25000" dirty="0" err="1" smtClean="0"/>
               <a:t>c</a:t>
             </a:r>
             <a:r>
-              <a:rPr lang="en-US" sz="2200" i="1" dirty="0"/>
+              <a:rPr lang="en-US" sz="2200" i="1" dirty="0" smtClean="0"/>
               <a:t> </a:t>
             </a:r>
             <a:r>
@@ -6409,6 +8621,474 @@
           </a:p>
         </p:txBody>
       </p:sp>
+      <mc:AlternateContent xmlns:mc="http://schemas.openxmlformats.org/markup-compatibility/2006">
+        <mc:Choice xmlns:a14="http://schemas.microsoft.com/office/drawing/2010/main" Requires="a14">
+          <p:sp>
+            <p:nvSpPr>
+              <p:cNvPr id="3" name="TextBox 2"/>
+              <p:cNvSpPr txBox="1"/>
+              <p:nvPr/>
+            </p:nvSpPr>
+            <p:spPr>
+              <a:xfrm>
+                <a:off x="4860032" y="1916832"/>
+                <a:ext cx="3325141" cy="2902654"/>
+              </a:xfrm>
+              <a:prstGeom prst="rect">
+                <a:avLst/>
+              </a:prstGeom>
+              <a:noFill/>
+            </p:spPr>
+            <p:txBody>
+              <a:bodyPr wrap="none" rtlCol="0">
+                <a:spAutoFit/>
+              </a:bodyPr>
+              <a:lstStyle/>
+              <a:p>
+                <a14:m>
+                  <m:oMathPara xmlns:m="http://schemas.openxmlformats.org/officeDocument/2006/math">
+                    <m:oMathParaPr>
+                      <m:jc m:val="centerGroup"/>
+                    </m:oMathParaPr>
+                    <m:oMath xmlns:m="http://schemas.openxmlformats.org/officeDocument/2006/math">
+                      <m:f>
+                        <m:fPr>
+                          <m:ctrlPr>
+                            <a:rPr lang="en-US" i="1" smtClean="0">
+                              <a:latin typeface="Cambria Math"/>
+                            </a:rPr>
+                          </m:ctrlPr>
+                        </m:fPr>
+                        <m:num>
+                          <m:r>
+                            <a:rPr lang="en-US" b="0" i="1" smtClean="0">
+                              <a:latin typeface="Cambria Math"/>
+                            </a:rPr>
+                            <m:t>𝑑𝐼</m:t>
+                          </m:r>
+                        </m:num>
+                        <m:den>
+                          <m:r>
+                            <a:rPr lang="en-US" b="0" i="1" smtClean="0">
+                              <a:latin typeface="Cambria Math"/>
+                            </a:rPr>
+                            <m:t>𝑑𝑆</m:t>
+                          </m:r>
+                        </m:den>
+                      </m:f>
+                      <m:r>
+                        <a:rPr lang="en-US" b="0" i="1" smtClean="0">
+                          <a:latin typeface="Cambria Math"/>
+                        </a:rPr>
+                        <m:t>=−1+</m:t>
+                      </m:r>
+                      <m:f>
+                        <m:fPr>
+                          <m:ctrlPr>
+                            <a:rPr lang="en-US" b="0" i="1" smtClean="0">
+                              <a:latin typeface="Cambria Math"/>
+                            </a:rPr>
+                          </m:ctrlPr>
+                        </m:fPr>
+                        <m:num>
+                          <m:r>
+                            <a:rPr lang="en-US" b="0" i="1" smtClean="0">
+                              <a:latin typeface="Cambria Math"/>
+                            </a:rPr>
+                            <m:t>𝑆</m:t>
+                          </m:r>
+                          <m:r>
+                            <a:rPr lang="en-US" b="0" i="1" baseline="-25000" smtClean="0">
+                              <a:latin typeface="Cambria Math"/>
+                            </a:rPr>
+                            <m:t>𝑐</m:t>
+                          </m:r>
+                        </m:num>
+                        <m:den>
+                          <m:r>
+                            <a:rPr lang="en-US" b="0" i="1" smtClean="0">
+                              <a:latin typeface="Cambria Math"/>
+                            </a:rPr>
+                            <m:t>𝑆</m:t>
+                          </m:r>
+                        </m:den>
+                      </m:f>
+                    </m:oMath>
+                  </m:oMathPara>
+                </a14:m>
+                <a:endParaRPr lang="en-US" b="0" dirty="0" smtClean="0"/>
+              </a:p>
+              <a:p>
+                <a:endParaRPr lang="en-US" dirty="0" smtClean="0"/>
+              </a:p>
+              <a:p>
+                <a14:m>
+                  <m:oMathPara xmlns:m="http://schemas.openxmlformats.org/officeDocument/2006/math">
+                    <m:oMathParaPr>
+                      <m:jc m:val="centerGroup"/>
+                    </m:oMathParaPr>
+                    <m:oMath xmlns:m="http://schemas.openxmlformats.org/officeDocument/2006/math">
+                      <m:r>
+                        <a:rPr lang="en-US" b="0" i="1" smtClean="0">
+                          <a:latin typeface="Cambria Math"/>
+                        </a:rPr>
+                        <m:t>𝐼</m:t>
+                      </m:r>
+                      <m:r>
+                        <a:rPr lang="en-US" b="0" i="1" smtClean="0">
+                          <a:latin typeface="Cambria Math"/>
+                        </a:rPr>
+                        <m:t>+</m:t>
+                      </m:r>
+                      <m:r>
+                        <a:rPr lang="en-US" b="0" i="1" smtClean="0">
+                          <a:latin typeface="Cambria Math"/>
+                        </a:rPr>
+                        <m:t>𝑆</m:t>
+                      </m:r>
+                      <m:r>
+                        <a:rPr lang="en-US" b="0" i="1" smtClean="0">
+                          <a:latin typeface="Cambria Math"/>
+                        </a:rPr>
+                        <m:t>−</m:t>
+                      </m:r>
+                      <m:r>
+                        <a:rPr lang="en-US" b="0" i="1" smtClean="0">
+                          <a:latin typeface="Cambria Math"/>
+                        </a:rPr>
+                        <m:t>𝑆𝑐</m:t>
+                      </m:r>
+                      <m:r>
+                        <a:rPr lang="en-US" b="0" i="1" baseline="-25000" smtClean="0">
+                          <a:latin typeface="Cambria Math"/>
+                        </a:rPr>
+                        <m:t> </m:t>
+                      </m:r>
+                      <m:r>
+                        <a:rPr lang="en-US" b="0" i="1" smtClean="0">
+                          <a:latin typeface="Cambria Math"/>
+                        </a:rPr>
+                        <m:t>𝑙𝑛</m:t>
+                      </m:r>
+                      <m:d>
+                        <m:dPr>
+                          <m:ctrlPr>
+                            <a:rPr lang="en-US" b="0" i="1" smtClean="0">
+                              <a:latin typeface="Cambria Math"/>
+                            </a:rPr>
+                          </m:ctrlPr>
+                        </m:dPr>
+                        <m:e>
+                          <m:r>
+                            <a:rPr lang="en-US" b="0" i="1" smtClean="0">
+                              <a:latin typeface="Cambria Math"/>
+                            </a:rPr>
+                            <m:t>𝑆</m:t>
+                          </m:r>
+                        </m:e>
+                      </m:d>
+                      <m:r>
+                        <a:rPr lang="en-US" b="0" i="1" smtClean="0">
+                          <a:latin typeface="Cambria Math"/>
+                        </a:rPr>
+                        <m:t>=</m:t>
+                      </m:r>
+                      <m:r>
+                        <a:rPr lang="en-US" b="0" i="1" smtClean="0">
+                          <a:latin typeface="Cambria Math"/>
+                        </a:rPr>
+                        <m:t>𝑐𝑜𝑛𝑠𝑡𝑎𝑛𝑡</m:t>
+                      </m:r>
+                      <m:r>
+                        <a:rPr lang="en-US" b="0" i="1" smtClean="0">
+                          <a:latin typeface="Cambria Math"/>
+                        </a:rPr>
+                        <m:t>=</m:t>
+                      </m:r>
+                    </m:oMath>
+                  </m:oMathPara>
+                </a14:m>
+                <a:endParaRPr lang="en-US" b="0" dirty="0" smtClean="0"/>
+              </a:p>
+              <a:p>
+                <a14:m>
+                  <m:oMathPara xmlns:m="http://schemas.openxmlformats.org/officeDocument/2006/math">
+                    <m:oMathParaPr>
+                      <m:jc m:val="centerGroup"/>
+                    </m:oMathParaPr>
+                    <m:oMath xmlns:m="http://schemas.openxmlformats.org/officeDocument/2006/math">
+                      <m:r>
+                        <a:rPr lang="en-US" b="0" i="1" smtClean="0">
+                          <a:latin typeface="Cambria Math"/>
+                        </a:rPr>
+                        <m:t>𝐼</m:t>
+                      </m:r>
+                      <m:r>
+                        <a:rPr lang="en-US" b="0" i="1" baseline="-25000" smtClean="0">
+                          <a:latin typeface="Cambria Math"/>
+                        </a:rPr>
+                        <m:t>0</m:t>
+                      </m:r>
+                      <m:r>
+                        <a:rPr lang="en-US" b="0" i="1" smtClean="0">
+                          <a:latin typeface="Cambria Math"/>
+                        </a:rPr>
+                        <m:t>+</m:t>
+                      </m:r>
+                      <m:r>
+                        <a:rPr lang="en-US" b="0" i="1" smtClean="0">
+                          <a:latin typeface="Cambria Math"/>
+                        </a:rPr>
+                        <m:t>𝑆</m:t>
+                      </m:r>
+                      <m:r>
+                        <a:rPr lang="en-US" b="0" i="1" baseline="-25000" smtClean="0">
+                          <a:latin typeface="Cambria Math"/>
+                        </a:rPr>
+                        <m:t>0</m:t>
+                      </m:r>
+                      <m:r>
+                        <a:rPr lang="en-US" b="0" i="1" smtClean="0">
+                          <a:latin typeface="Cambria Math"/>
+                        </a:rPr>
+                        <m:t> −</m:t>
+                      </m:r>
+                      <m:r>
+                        <a:rPr lang="en-US" b="0" i="1" smtClean="0">
+                          <a:latin typeface="Cambria Math"/>
+                        </a:rPr>
+                        <m:t>𝑆𝑐</m:t>
+                      </m:r>
+                      <m:r>
+                        <a:rPr lang="en-US" b="0" i="1" smtClean="0">
+                          <a:latin typeface="Cambria Math"/>
+                        </a:rPr>
+                        <m:t> </m:t>
+                      </m:r>
+                      <m:r>
+                        <m:rPr>
+                          <m:sty m:val="p"/>
+                        </m:rPr>
+                        <a:rPr lang="en-US" b="0" i="0" smtClean="0">
+                          <a:latin typeface="Cambria Math"/>
+                        </a:rPr>
+                        <m:t>ln</m:t>
+                      </m:r>
+                      <m:r>
+                        <a:rPr lang="en-US" b="0" i="1" smtClean="0">
+                          <a:latin typeface="Cambria Math"/>
+                        </a:rPr>
+                        <m:t>⁡(</m:t>
+                      </m:r>
+                      <m:r>
+                        <a:rPr lang="en-US" b="0" i="1" smtClean="0">
+                          <a:latin typeface="Cambria Math"/>
+                        </a:rPr>
+                        <m:t>𝑆</m:t>
+                      </m:r>
+                      <m:r>
+                        <a:rPr lang="en-US" b="0" i="1" baseline="-25000" smtClean="0">
+                          <a:latin typeface="Cambria Math"/>
+                        </a:rPr>
+                        <m:t>0</m:t>
+                      </m:r>
+                      <m:r>
+                        <a:rPr lang="en-US" b="0" i="1" smtClean="0">
+                          <a:latin typeface="Cambria Math"/>
+                        </a:rPr>
+                        <m:t>)</m:t>
+                      </m:r>
+                    </m:oMath>
+                  </m:oMathPara>
+                </a14:m>
+                <a:endParaRPr lang="en-US" dirty="0" smtClean="0"/>
+              </a:p>
+              <a:p>
+                <a:endParaRPr lang="en-US" dirty="0"/>
+              </a:p>
+              <a:p>
+                <a14:m>
+                  <m:oMathPara xmlns:m="http://schemas.openxmlformats.org/officeDocument/2006/math">
+                    <m:oMathParaPr>
+                      <m:jc m:val="centerGroup"/>
+                    </m:oMathParaPr>
+                    <m:oMath xmlns:m="http://schemas.openxmlformats.org/officeDocument/2006/math">
+                      <m:r>
+                        <a:rPr lang="en-US" b="0" i="1" smtClean="0">
+                          <a:latin typeface="Cambria Math"/>
+                        </a:rPr>
+                        <m:t>⇒</m:t>
+                      </m:r>
+                      <m:r>
+                        <a:rPr lang="en-US" b="0" i="1" smtClean="0">
+                          <a:latin typeface="Cambria Math"/>
+                        </a:rPr>
+                        <m:t>𝐼𝑚</m:t>
+                      </m:r>
+                      <m:r>
+                        <a:rPr lang="en-US" b="0" i="1" baseline="-25000" smtClean="0">
+                          <a:latin typeface="Cambria Math"/>
+                        </a:rPr>
+                        <m:t>𝑎𝑥</m:t>
+                      </m:r>
+                      <m:r>
+                        <a:rPr lang="en-US" b="0" i="1" smtClean="0">
+                          <a:latin typeface="Cambria Math"/>
+                        </a:rPr>
+                        <m:t>=</m:t>
+                      </m:r>
+                      <m:r>
+                        <a:rPr lang="en-US" b="0" i="1" smtClean="0">
+                          <a:latin typeface="Cambria Math"/>
+                        </a:rPr>
+                        <m:t>𝑁</m:t>
+                      </m:r>
+                      <m:r>
+                        <a:rPr lang="en-US" b="0" i="1" smtClean="0">
+                          <a:latin typeface="Cambria Math"/>
+                        </a:rPr>
+                        <m:t>−</m:t>
+                      </m:r>
+                      <m:r>
+                        <a:rPr lang="en-US" b="0" i="1" smtClean="0">
+                          <a:latin typeface="Cambria Math"/>
+                        </a:rPr>
+                        <m:t>𝑆𝑐</m:t>
+                      </m:r>
+                      <m:r>
+                        <a:rPr lang="en-US" b="0" i="1" smtClean="0">
+                          <a:latin typeface="Cambria Math"/>
+                        </a:rPr>
+                        <m:t>+</m:t>
+                      </m:r>
+                      <m:r>
+                        <a:rPr lang="en-US" b="0" i="1" smtClean="0">
+                          <a:latin typeface="Cambria Math"/>
+                        </a:rPr>
+                        <m:t>𝑆𝑐</m:t>
+                      </m:r>
+                      <m:r>
+                        <a:rPr lang="en-US" b="0" i="1" smtClean="0">
+                          <a:latin typeface="Cambria Math"/>
+                        </a:rPr>
+                        <m:t> </m:t>
+                      </m:r>
+                      <m:r>
+                        <m:rPr>
+                          <m:sty m:val="p"/>
+                        </m:rPr>
+                        <a:rPr lang="en-US" b="0" i="0" smtClean="0">
+                          <a:latin typeface="Cambria Math"/>
+                        </a:rPr>
+                        <m:t>ln</m:t>
+                      </m:r>
+                      <m:r>
+                        <a:rPr lang="en-US" b="0" i="1" smtClean="0">
+                          <a:latin typeface="Cambria Math"/>
+                        </a:rPr>
+                        <m:t>⁡</m:t>
+                      </m:r>
+                      <m:d>
+                        <m:dPr>
+                          <m:ctrlPr>
+                            <a:rPr lang="en-US" b="0" i="1" smtClean="0">
+                              <a:latin typeface="Cambria Math"/>
+                            </a:rPr>
+                          </m:ctrlPr>
+                        </m:dPr>
+                        <m:e>
+                          <m:f>
+                            <m:fPr>
+                              <m:ctrlPr>
+                                <a:rPr lang="en-US" i="1">
+                                  <a:latin typeface="Cambria Math"/>
+                                </a:rPr>
+                              </m:ctrlPr>
+                            </m:fPr>
+                            <m:num>
+                              <m:r>
+                                <a:rPr lang="en-US" i="1">
+                                  <a:latin typeface="Cambria Math"/>
+                                </a:rPr>
+                                <m:t>𝑆</m:t>
+                              </m:r>
+                              <m:r>
+                                <a:rPr lang="en-US" i="1" baseline="-25000">
+                                  <a:latin typeface="Cambria Math"/>
+                                </a:rPr>
+                                <m:t>𝑐</m:t>
+                              </m:r>
+                            </m:num>
+                            <m:den>
+                              <m:r>
+                                <a:rPr lang="en-US" i="1">
+                                  <a:latin typeface="Cambria Math"/>
+                                </a:rPr>
+                                <m:t>𝑆</m:t>
+                              </m:r>
+                              <m:r>
+                                <a:rPr lang="en-US" i="1" baseline="-25000">
+                                  <a:latin typeface="Cambria Math"/>
+                                </a:rPr>
+                                <m:t>0</m:t>
+                              </m:r>
+                            </m:den>
+                          </m:f>
+                        </m:e>
+                      </m:d>
+                    </m:oMath>
+                  </m:oMathPara>
+                </a14:m>
+                <a:endParaRPr lang="en-US" dirty="0" smtClean="0"/>
+              </a:p>
+              <a:p>
+                <a:endParaRPr lang="en-US" dirty="0"/>
+              </a:p>
+              <a:p>
+                <a:endParaRPr lang="en-US" dirty="0"/>
+              </a:p>
+            </p:txBody>
+          </p:sp>
+        </mc:Choice>
+        <mc:Fallback>
+          <p:sp>
+            <p:nvSpPr>
+              <p:cNvPr id="3" name="TextBox 2"/>
+              <p:cNvSpPr txBox="1">
+                <a:spLocks noRot="1" noChangeAspect="1" noMove="1" noResize="1" noEditPoints="1" noAdjustHandles="1" noChangeArrowheads="1" noChangeShapeType="1" noTextEdit="1"/>
+              </p:cNvSpPr>
+              <p:nvPr/>
+            </p:nvSpPr>
+            <p:spPr>
+              <a:xfrm>
+                <a:off x="4860032" y="1916832"/>
+                <a:ext cx="3325141" cy="2902654"/>
+              </a:xfrm>
+              <a:prstGeom prst="rect">
+                <a:avLst/>
+              </a:prstGeom>
+              <a:blipFill rotWithShape="1">
+                <a:blip r:embed="rId3"/>
+                <a:stretch>
+                  <a:fillRect/>
+                </a:stretch>
+              </a:blipFill>
+            </p:spPr>
+            <p:txBody>
+              <a:bodyPr/>
+              <a:lstStyle/>
+              <a:p>
+                <a:r>
+                  <a:rPr lang="en-US">
+                    <a:noFill/>
+                  </a:rPr>
+                  <a:t> </a:t>
+                </a:r>
+              </a:p>
+            </p:txBody>
+          </p:sp>
+        </mc:Fallback>
+      </mc:AlternateContent>
     </p:spTree>
     <p:extLst>
       <p:ext uri="{BB962C8B-B14F-4D97-AF65-F5344CB8AC3E}">
@@ -6607,8 +9287,8 @@
           </a:p>
         </p:txBody>
       </p:sp>
-      <mc:AlternateContent xmlns:mc="http://schemas.openxmlformats.org/markup-compatibility/2006">
-        <mc:Choice xmlns:a14="http://schemas.microsoft.com/office/drawing/2010/main" Requires="a14">
+      <mc:AlternateContent xmlns:mc="http://schemas.openxmlformats.org/markup-compatibility/2006" xmlns:a14="http://schemas.microsoft.com/office/drawing/2010/main">
+        <mc:Choice Requires="a14">
           <p:sp>
             <p:nvSpPr>
               <p:cNvPr id="8" name="Title 1"/>
@@ -6628,7 +9308,7 @@
             </p:spPr>
             <p:txBody>
               <a:bodyPr vert="horz" lIns="91440" tIns="45720" rIns="91440" bIns="45720" rtlCol="0" anchor="ctr">
-                <a:normAutofit fontScale="67500" lnSpcReduction="20000"/>
+                <a:normAutofit fontScale="75000" lnSpcReduction="20000"/>
               </a:bodyPr>
               <a:lstStyle>
                 <a:lvl1pPr algn="ctr" defTabSz="914400" rtl="0" eaLnBrk="1" latinLnBrk="0" hangingPunct="1">
@@ -6660,6 +9340,7 @@
                 </a:r>
               </a:p>
               <a:p>
+                <a:pPr/>
                 <a14:m>
                   <m:oMathPara xmlns:m="http://schemas.openxmlformats.org/officeDocument/2006/math">
                     <m:oMathParaPr>
@@ -6742,6 +9423,7 @@
                 </a:endParaRPr>
               </a:p>
               <a:p>
+                <a:pPr/>
                 <a14:m>
                   <m:oMathPara xmlns:m="http://schemas.openxmlformats.org/officeDocument/2006/math">
                     <m:oMathParaPr>
@@ -6796,7 +9478,7 @@
                       <m:d>
                         <m:dPr>
                           <m:ctrlPr>
-                            <a:rPr lang="en-US" sz="3300" b="0" i="0" smtClean="0">
+                            <a:rPr lang="en-US" sz="3300" b="0" i="1" smtClean="0">
                               <a:latin typeface="Cambria Math"/>
                             </a:rPr>
                           </m:ctrlPr>
@@ -6860,6 +9542,7 @@
                 <a:endParaRPr lang="en-US" sz="3300" dirty="0" smtClean="0"/>
               </a:p>
               <a:p>
+                <a:pPr/>
                 <a14:m>
                   <m:oMathPara xmlns:m="http://schemas.openxmlformats.org/officeDocument/2006/math">
                     <m:oMathParaPr>
@@ -7087,6 +9770,7 @@
                 <a:endParaRPr lang="en-US" sz="3300" dirty="0" smtClean="0"/>
               </a:p>
               <a:p>
+                <a:pPr/>
                 <a14:m>
                   <m:oMathPara xmlns:m="http://schemas.openxmlformats.org/officeDocument/2006/math">
                     <m:oMathParaPr>
@@ -7120,13 +9804,7 @@
                         <a:rPr lang="en-US" sz="3300" b="0" i="1" smtClean="0">
                           <a:latin typeface="Cambria Math"/>
                         </a:rPr>
-                        <m:t>=</m:t>
-                      </m:r>
-                      <m:r>
-                        <a:rPr lang="en-US" sz="3300" b="0" i="1" smtClean="0">
-                          <a:latin typeface="Cambria Math"/>
-                        </a:rPr>
-                        <m:t>0</m:t>
+                        <m:t>=0</m:t>
                       </m:r>
                     </m:oMath>
                   </m:oMathPara>
@@ -7142,7 +9820,7 @@
             </p:txBody>
           </p:sp>
         </mc:Choice>
-        <mc:Fallback>
+        <mc:Fallback xmlns="">
           <p:sp>
             <p:nvSpPr>
               <p:cNvPr id="8" name="Title 1"/>
@@ -7379,8 +10057,8 @@
           </a:p>
         </p:txBody>
       </p:sp>
-      <mc:AlternateContent xmlns:mc="http://schemas.openxmlformats.org/markup-compatibility/2006">
-        <mc:Choice xmlns:a14="http://schemas.microsoft.com/office/drawing/2010/main" Requires="a14">
+      <mc:AlternateContent xmlns:mc="http://schemas.openxmlformats.org/markup-compatibility/2006" xmlns:a14="http://schemas.microsoft.com/office/drawing/2010/main">
+        <mc:Choice Requires="a14">
           <p:sp>
             <p:nvSpPr>
               <p:cNvPr id="8" name="Title 1"/>
@@ -7465,6 +10143,7 @@
                 <a:endParaRPr lang="bg-BG" sz="2400" dirty="0" smtClean="0"/>
               </a:p>
               <a:p>
+                <a:pPr/>
                 <a14:m>
                   <m:oMathPara xmlns:m="http://schemas.openxmlformats.org/officeDocument/2006/math">
                     <m:oMathParaPr>
@@ -7731,6 +10410,7 @@
                 <a:endParaRPr lang="bg-BG" sz="2400" dirty="0" smtClean="0"/>
               </a:p>
               <a:p>
+                <a:pPr/>
                 <a14:m>
                   <m:oMathPara xmlns:m="http://schemas.openxmlformats.org/officeDocument/2006/math">
                     <m:oMathParaPr>
@@ -7758,13 +10438,7 @@
                             <a:rPr lang="en-US" sz="2400" i="1">
                               <a:latin typeface="Cambria Math"/>
                             </a:rPr>
-                            <m:t>𝑑</m:t>
-                          </m:r>
-                          <m:r>
-                            <a:rPr lang="en-US" sz="2400" i="1">
-                              <a:latin typeface="Cambria Math"/>
-                            </a:rPr>
-                            <m:t>𝑡</m:t>
+                            <m:t>𝑑𝑡</m:t>
                           </m:r>
                         </m:den>
                       </m:f>
@@ -8328,7 +11002,7 @@
             </p:txBody>
           </p:sp>
         </mc:Choice>
-        <mc:Fallback>
+        <mc:Fallback xmlns="">
           <p:sp>
             <p:nvSpPr>
               <p:cNvPr id="8" name="Title 1"/>

</xml_diff>